<commit_message>
PowerPoint Updates for Presentation
</commit_message>
<xml_diff>
--- a/documentation/presentation/Azure _IaC_Flavors.pptx
+++ b/documentation/presentation/Azure _IaC_Flavors.pptx
@@ -14,12 +14,14 @@
     <p:sldId id="260" r:id="rId8"/>
     <p:sldId id="261" r:id="rId9"/>
     <p:sldId id="266" r:id="rId10"/>
-    <p:sldId id="262" r:id="rId11"/>
-    <p:sldId id="263" r:id="rId12"/>
-    <p:sldId id="264" r:id="rId13"/>
-    <p:sldId id="267" r:id="rId14"/>
-    <p:sldId id="270" r:id="rId15"/>
-    <p:sldId id="268" r:id="rId16"/>
+    <p:sldId id="263" r:id="rId11"/>
+    <p:sldId id="272" r:id="rId12"/>
+    <p:sldId id="262" r:id="rId13"/>
+    <p:sldId id="264" r:id="rId14"/>
+    <p:sldId id="267" r:id="rId15"/>
+    <p:sldId id="270" r:id="rId16"/>
+    <p:sldId id="268" r:id="rId17"/>
+    <p:sldId id="271" r:id="rId18"/>
   </p:sldIdLst>
   <p:sldSz cx="12192000" cy="6858000"/>
   <p:notesSz cx="6858000" cy="9144000"/>
@@ -273,7 +275,7 @@
           <a:p>
             <a:fld id="{C632AA3B-3587-4601-94E3-578ED244E65F}" type="datetimeFigureOut">
               <a:rPr lang="en-US" smtClean="0"/>
-              <a:t>9/22/2022</a:t>
+              <a:t>10/1/2022</a:t>
             </a:fld>
             <a:endParaRPr lang="en-US"/>
           </a:p>
@@ -471,7 +473,7 @@
           <a:p>
             <a:fld id="{C632AA3B-3587-4601-94E3-578ED244E65F}" type="datetimeFigureOut">
               <a:rPr lang="en-US" smtClean="0"/>
-              <a:t>9/22/2022</a:t>
+              <a:t>10/1/2022</a:t>
             </a:fld>
             <a:endParaRPr lang="en-US"/>
           </a:p>
@@ -679,7 +681,7 @@
           <a:p>
             <a:fld id="{C632AA3B-3587-4601-94E3-578ED244E65F}" type="datetimeFigureOut">
               <a:rPr lang="en-US" smtClean="0"/>
-              <a:t>9/22/2022</a:t>
+              <a:t>10/1/2022</a:t>
             </a:fld>
             <a:endParaRPr lang="en-US"/>
           </a:p>
@@ -877,7 +879,7 @@
           <a:p>
             <a:fld id="{C632AA3B-3587-4601-94E3-578ED244E65F}" type="datetimeFigureOut">
               <a:rPr lang="en-US" smtClean="0"/>
-              <a:t>9/22/2022</a:t>
+              <a:t>10/1/2022</a:t>
             </a:fld>
             <a:endParaRPr lang="en-US"/>
           </a:p>
@@ -1152,7 +1154,7 @@
           <a:p>
             <a:fld id="{C632AA3B-3587-4601-94E3-578ED244E65F}" type="datetimeFigureOut">
               <a:rPr lang="en-US" smtClean="0"/>
-              <a:t>9/22/2022</a:t>
+              <a:t>10/1/2022</a:t>
             </a:fld>
             <a:endParaRPr lang="en-US"/>
           </a:p>
@@ -1417,7 +1419,7 @@
           <a:p>
             <a:fld id="{C632AA3B-3587-4601-94E3-578ED244E65F}" type="datetimeFigureOut">
               <a:rPr lang="en-US" smtClean="0"/>
-              <a:t>9/22/2022</a:t>
+              <a:t>10/1/2022</a:t>
             </a:fld>
             <a:endParaRPr lang="en-US"/>
           </a:p>
@@ -1829,7 +1831,7 @@
           <a:p>
             <a:fld id="{C632AA3B-3587-4601-94E3-578ED244E65F}" type="datetimeFigureOut">
               <a:rPr lang="en-US" smtClean="0"/>
-              <a:t>9/22/2022</a:t>
+              <a:t>10/1/2022</a:t>
             </a:fld>
             <a:endParaRPr lang="en-US"/>
           </a:p>
@@ -1970,7 +1972,7 @@
           <a:p>
             <a:fld id="{C632AA3B-3587-4601-94E3-578ED244E65F}" type="datetimeFigureOut">
               <a:rPr lang="en-US" smtClean="0"/>
-              <a:t>9/22/2022</a:t>
+              <a:t>10/1/2022</a:t>
             </a:fld>
             <a:endParaRPr lang="en-US"/>
           </a:p>
@@ -2083,7 +2085,7 @@
           <a:p>
             <a:fld id="{C632AA3B-3587-4601-94E3-578ED244E65F}" type="datetimeFigureOut">
               <a:rPr lang="en-US" smtClean="0"/>
-              <a:t>9/22/2022</a:t>
+              <a:t>10/1/2022</a:t>
             </a:fld>
             <a:endParaRPr lang="en-US"/>
           </a:p>
@@ -2394,7 +2396,7 @@
           <a:p>
             <a:fld id="{C632AA3B-3587-4601-94E3-578ED244E65F}" type="datetimeFigureOut">
               <a:rPr lang="en-US" smtClean="0"/>
-              <a:t>9/22/2022</a:t>
+              <a:t>10/1/2022</a:t>
             </a:fld>
             <a:endParaRPr lang="en-US"/>
           </a:p>
@@ -2682,7 +2684,7 @@
           <a:p>
             <a:fld id="{C632AA3B-3587-4601-94E3-578ED244E65F}" type="datetimeFigureOut">
               <a:rPr lang="en-US" smtClean="0"/>
-              <a:t>9/22/2022</a:t>
+              <a:t>10/1/2022</a:t>
             </a:fld>
             <a:endParaRPr lang="en-US"/>
           </a:p>
@@ -2923,7 +2925,7 @@
           <a:p>
             <a:fld id="{C632AA3B-3587-4601-94E3-578ED244E65F}" type="datetimeFigureOut">
               <a:rPr lang="en-US" smtClean="0"/>
-              <a:t>9/22/2022</a:t>
+              <a:t>10/1/2022</a:t>
             </a:fld>
             <a:endParaRPr lang="en-US"/>
           </a:p>
@@ -3563,7 +3565,7 @@
     <p:bg>
       <p:bgPr>
         <a:solidFill>
-          <a:schemeClr val="accent1">
+          <a:schemeClr val="accent5">
             <a:alpha val="75000"/>
           </a:schemeClr>
         </a:solidFill>
@@ -3589,7 +3591,7 @@
           <p:cNvPr id="2" name="Title 1">
             <a:extLst>
               <a:ext uri="{FF2B5EF4-FFF2-40B4-BE49-F238E27FC236}">
-                <a16:creationId xmlns:a16="http://schemas.microsoft.com/office/drawing/2014/main" id="{6607947C-C54B-3B21-0650-03F96F7FF63A}"/>
+                <a16:creationId xmlns:a16="http://schemas.microsoft.com/office/drawing/2014/main" id="{038580FE-F94F-5E55-2943-638ECD2AEFDB}"/>
               </a:ext>
             </a:extLst>
           </p:cNvPr>
@@ -3611,7 +3613,7 @@
                   <a:schemeClr val="bg1"/>
                 </a:solidFill>
               </a:rPr>
-              <a:t>Azure Resource Manager Template (ARM)</a:t>
+              <a:t>Azure Bicep</a:t>
             </a:r>
           </a:p>
         </p:txBody>
@@ -3621,7 +3623,7 @@
           <p:cNvPr id="3" name="Content Placeholder 2">
             <a:extLst>
               <a:ext uri="{FF2B5EF4-FFF2-40B4-BE49-F238E27FC236}">
-                <a16:creationId xmlns:a16="http://schemas.microsoft.com/office/drawing/2014/main" id="{55A95F38-D9A6-24A6-EAF1-9CDC8D36B1E7}"/>
+                <a16:creationId xmlns:a16="http://schemas.microsoft.com/office/drawing/2014/main" id="{2A9455D1-81D2-020B-204B-B0E020DA431B}"/>
               </a:ext>
             </a:extLst>
           </p:cNvPr>
@@ -3650,7 +3652,7 @@
                 </a:solidFill>
                 <a:effectLst/>
               </a:rPr>
-              <a:t>JSON File Format</a:t>
+              <a:t>Domain Specific Language (DSL)</a:t>
             </a:r>
           </a:p>
           <a:p>
@@ -3658,6 +3660,35 @@
               <a:buFont typeface="Arial" panose="020B0604020202020204" pitchFamily="34" charset="0"/>
               <a:buChar char="•"/>
             </a:pPr>
+            <a:r>
+              <a:rPr lang="en-US" sz="1800" dirty="0">
+                <a:solidFill>
+                  <a:schemeClr val="bg1"/>
+                </a:solidFill>
+              </a:rPr>
+              <a:t>No State File</a:t>
+            </a:r>
+            <a:endParaRPr lang="en-US" sz="1800" b="0" i="0" dirty="0">
+              <a:solidFill>
+                <a:schemeClr val="bg1"/>
+              </a:solidFill>
+              <a:effectLst/>
+            </a:endParaRPr>
+          </a:p>
+          <a:p>
+            <a:pPr algn="l">
+              <a:buFont typeface="Arial" panose="020B0604020202020204" pitchFamily="34" charset="0"/>
+              <a:buChar char="•"/>
+            </a:pPr>
+            <a:r>
+              <a:rPr lang="en-US" sz="1800" b="0" i="0" dirty="0" err="1">
+                <a:solidFill>
+                  <a:schemeClr val="bg1"/>
+                </a:solidFill>
+                <a:effectLst/>
+              </a:rPr>
+              <a:t>Transpiles</a:t>
+            </a:r>
             <a:r>
               <a:rPr lang="en-US" sz="1800" b="0" i="0" dirty="0">
                 <a:solidFill>
@@ -3665,7 +3696,7 @@
                 </a:solidFill>
                 <a:effectLst/>
               </a:rPr>
-              <a:t>Explicitly track dependencies</a:t>
+              <a:t> to ARM template</a:t>
             </a:r>
           </a:p>
           <a:p>
@@ -3673,6 +3704,14 @@
               <a:buFont typeface="Arial" panose="020B0604020202020204" pitchFamily="34" charset="0"/>
               <a:buChar char="•"/>
             </a:pPr>
+            <a:r>
+              <a:rPr lang="en-US" sz="1800" dirty="0">
+                <a:solidFill>
+                  <a:schemeClr val="bg1"/>
+                </a:solidFill>
+              </a:rPr>
+              <a:t>R</a:t>
+            </a:r>
             <a:r>
               <a:rPr lang="en-US" sz="1800" b="0" i="0" dirty="0">
                 <a:solidFill>
@@ -3680,7 +3719,7 @@
                 </a:solidFill>
                 <a:effectLst/>
               </a:rPr>
-              <a:t>Export from Azure</a:t>
+              <a:t>eleased monthly</a:t>
             </a:r>
           </a:p>
           <a:p>
@@ -3710,47 +3749,37 @@
                 </a:solidFill>
                 <a:effectLst/>
               </a:rPr>
-              <a:t>Azure specific</a:t>
-            </a:r>
-          </a:p>
-          <a:p>
-            <a:pPr algn="l">
-              <a:buFont typeface="Arial" panose="020B0604020202020204" pitchFamily="34" charset="0"/>
-              <a:buChar char="•"/>
-            </a:pPr>
-            <a:r>
-              <a:rPr lang="en-US" sz="1800" b="0" i="0" dirty="0">
-                <a:solidFill>
-                  <a:schemeClr val="bg1"/>
-                </a:solidFill>
-                <a:effectLst/>
-              </a:rPr>
-              <a:t>No state file</a:t>
-            </a:r>
-          </a:p>
-          <a:p>
-            <a:pPr algn="l">
-              <a:buFont typeface="Arial" panose="020B0604020202020204" pitchFamily="34" charset="0"/>
-              <a:buChar char="•"/>
-            </a:pPr>
+              <a:t>Azure only</a:t>
+            </a:r>
+          </a:p>
+          <a:p>
             <a:r>
               <a:rPr lang="en-US" sz="1800" dirty="0">
                 <a:solidFill>
                   <a:schemeClr val="bg1"/>
                 </a:solidFill>
               </a:rPr>
-              <a:t>Native Tool</a:t>
-            </a:r>
-            <a:endParaRPr lang="en-US" dirty="0"/>
+              <a:t>Registry Support</a:t>
+            </a:r>
+          </a:p>
+          <a:p>
+            <a:r>
+              <a:rPr lang="en-US" sz="1800" dirty="0">
+                <a:solidFill>
+                  <a:schemeClr val="bg1"/>
+                </a:solidFill>
+              </a:rPr>
+              <a:t>First Production release v 3.1 in March 2021</a:t>
+            </a:r>
           </a:p>
         </p:txBody>
       </p:sp>
       <p:pic>
         <p:nvPicPr>
-          <p:cNvPr id="6" name="Picture 5">
-            <a:extLst>
-              <a:ext uri="{FF2B5EF4-FFF2-40B4-BE49-F238E27FC236}">
-                <a16:creationId xmlns:a16="http://schemas.microsoft.com/office/drawing/2014/main" id="{C0C89A4B-F717-5653-704A-B88CE3A40230}"/>
+          <p:cNvPr id="4" name="Picture 3">
+            <a:extLst>
+              <a:ext uri="{FF2B5EF4-FFF2-40B4-BE49-F238E27FC236}">
+                <a16:creationId xmlns:a16="http://schemas.microsoft.com/office/drawing/2014/main" id="{2C5D95B9-4EFF-7657-6AE4-4AA34D27DFF6}"/>
               </a:ext>
             </a:extLst>
           </p:cNvPr>
@@ -3768,7 +3797,7 @@
         <p:spPr>
           <a:xfrm>
             <a:off x="0" y="1359047"/>
-            <a:ext cx="12192116" cy="45719"/>
+            <a:ext cx="12192000" cy="45719"/>
           </a:xfrm>
           <a:prstGeom prst="rect">
             <a:avLst/>
@@ -3777,10 +3806,10 @@
       </p:pic>
       <p:pic>
         <p:nvPicPr>
-          <p:cNvPr id="6146" name="Picture 2" descr="Diagram illustrating Azure Consistent Management Layer">
-            <a:extLst>
-              <a:ext uri="{FF2B5EF4-FFF2-40B4-BE49-F238E27FC236}">
-                <a16:creationId xmlns:a16="http://schemas.microsoft.com/office/drawing/2014/main" id="{0E46109B-F337-BDAA-1FE7-88BA120683DA}"/>
+          <p:cNvPr id="7170" name="Picture 2" descr="Azure Bicep Logo">
+            <a:extLst>
+              <a:ext uri="{FF2B5EF4-FFF2-40B4-BE49-F238E27FC236}">
+                <a16:creationId xmlns:a16="http://schemas.microsoft.com/office/drawing/2014/main" id="{83618764-6177-22B8-468A-FDCD5DEEBCAD}"/>
               </a:ext>
             </a:extLst>
           </p:cNvPr>
@@ -3804,8 +3833,8 @@
         </p:blipFill>
         <p:spPr bwMode="auto">
           <a:xfrm>
-            <a:off x="4737203" y="2011313"/>
-            <a:ext cx="7158621" cy="3767695"/>
+            <a:off x="10935659" y="35237"/>
+            <a:ext cx="1256341" cy="1256341"/>
           </a:xfrm>
           <a:prstGeom prst="rect">
             <a:avLst/>
@@ -3824,10 +3853,10 @@
       </p:pic>
       <p:pic>
         <p:nvPicPr>
-          <p:cNvPr id="6150" name="Picture 6" descr="Azure Resource Manager Logo">
-            <a:extLst>
-              <a:ext uri="{FF2B5EF4-FFF2-40B4-BE49-F238E27FC236}">
-                <a16:creationId xmlns:a16="http://schemas.microsoft.com/office/drawing/2014/main" id="{93C14F70-DEF1-B7B4-8B4F-FB421FDD0773}"/>
+          <p:cNvPr id="7174" name="Picture 6" descr="Project Bicep, the new ARM DSL from Microsoft - Plain Concepts">
+            <a:extLst>
+              <a:ext uri="{FF2B5EF4-FFF2-40B4-BE49-F238E27FC236}">
+                <a16:creationId xmlns:a16="http://schemas.microsoft.com/office/drawing/2014/main" id="{BCBF6348-5404-18CD-23D8-BB9498CB4A06}"/>
               </a:ext>
             </a:extLst>
           </p:cNvPr>
@@ -3851,8 +3880,8 @@
         </p:blipFill>
         <p:spPr bwMode="auto">
           <a:xfrm>
-            <a:off x="10602617" y="44499"/>
-            <a:ext cx="1502365" cy="1247080"/>
+            <a:off x="6340030" y="2561548"/>
+            <a:ext cx="5400675" cy="3190875"/>
           </a:xfrm>
           <a:prstGeom prst="rect">
             <a:avLst/>
@@ -3874,7 +3903,7 @@
           <p:cNvPr id="7" name="Picture 6" descr="QR Code for https://aka.ms/HeartlandDev22 &#10;Scan to follow along the examples and additional documentation">
             <a:extLst>
               <a:ext uri="{FF2B5EF4-FFF2-40B4-BE49-F238E27FC236}">
-                <a16:creationId xmlns:a16="http://schemas.microsoft.com/office/drawing/2014/main" id="{E02F9D0B-C64D-55FF-E27C-1A2798D06D1A}"/>
+                <a16:creationId xmlns:a16="http://schemas.microsoft.com/office/drawing/2014/main" id="{1155A42A-E5A7-AA0E-7FE5-F687DCE7A3B3}"/>
               </a:ext>
             </a:extLst>
           </p:cNvPr>
@@ -3910,7 +3939,7 @@
           <p:cNvPr id="8" name="TextBox 7">
             <a:extLst>
               <a:ext uri="{FF2B5EF4-FFF2-40B4-BE49-F238E27FC236}">
-                <a16:creationId xmlns:a16="http://schemas.microsoft.com/office/drawing/2014/main" id="{CCEA11BE-AE8F-AF2E-BC75-D2686C435D7D}"/>
+                <a16:creationId xmlns:a16="http://schemas.microsoft.com/office/drawing/2014/main" id="{BECA8AA3-1A0D-1648-E1B1-C19DD621A089}"/>
               </a:ext>
             </a:extLst>
           </p:cNvPr>
@@ -3947,7 +3976,7 @@
     </p:spTree>
     <p:extLst>
       <p:ext uri="{BB962C8B-B14F-4D97-AF65-F5344CB8AC3E}">
-        <p14:creationId xmlns:p14="http://schemas.microsoft.com/office/powerpoint/2010/main" val="606951253"/>
+        <p14:creationId xmlns:p14="http://schemas.microsoft.com/office/powerpoint/2010/main" val="3053191635"/>
       </p:ext>
     </p:extLst>
   </p:cSld>
@@ -4050,7 +4079,7 @@
                 </a:solidFill>
                 <a:effectLst/>
               </a:rPr>
-              <a:t>Domain Specific Language (DSL)</a:t>
+              <a:t>Resource Creates and updates</a:t>
             </a:r>
           </a:p>
           <a:p>
@@ -4064,90 +4093,28 @@
                   <a:schemeClr val="bg1"/>
                 </a:solidFill>
               </a:rPr>
-              <a:t>No State File</a:t>
-            </a:r>
-            <a:endParaRPr lang="en-US" sz="1800" b="0" i="0" dirty="0">
-              <a:solidFill>
-                <a:schemeClr val="bg1"/>
-              </a:solidFill>
-              <a:effectLst/>
-            </a:endParaRPr>
-          </a:p>
-          <a:p>
-            <a:pPr algn="l">
-              <a:buFont typeface="Arial" panose="020B0604020202020204" pitchFamily="34" charset="0"/>
-              <a:buChar char="•"/>
-            </a:pPr>
-            <a:r>
-              <a:rPr lang="en-US" sz="1800" b="0" i="0" dirty="0" err="1">
-                <a:solidFill>
-                  <a:schemeClr val="bg1"/>
-                </a:solidFill>
-                <a:effectLst/>
-              </a:rPr>
-              <a:t>Transpiles</a:t>
-            </a:r>
-            <a:r>
-              <a:rPr lang="en-US" sz="1800" b="0" i="0" dirty="0">
-                <a:solidFill>
-                  <a:schemeClr val="bg1"/>
-                </a:solidFill>
-                <a:effectLst/>
-              </a:rPr>
-              <a:t> to ARM template</a:t>
-            </a:r>
-          </a:p>
-          <a:p>
-            <a:pPr algn="l">
-              <a:buFont typeface="Arial" panose="020B0604020202020204" pitchFamily="34" charset="0"/>
-              <a:buChar char="•"/>
-            </a:pPr>
+              <a:t>Shared August Bicep Community Call</a:t>
+            </a:r>
+          </a:p>
+          <a:p>
             <a:r>
               <a:rPr lang="en-US" sz="1800" dirty="0">
                 <a:solidFill>
                   <a:schemeClr val="bg1"/>
                 </a:solidFill>
               </a:rPr>
-              <a:t>R</a:t>
-            </a:r>
-            <a:r>
-              <a:rPr lang="en-US" sz="1800" b="0" i="0" dirty="0">
+              <a:t>May `21</a:t>
+            </a:r>
+          </a:p>
+          <a:p>
+            <a:pPr lvl="1"/>
+            <a:r>
+              <a:rPr lang="en-US" sz="1400" dirty="0">
                 <a:solidFill>
                   <a:schemeClr val="bg1"/>
                 </a:solidFill>
-                <a:effectLst/>
               </a:rPr>
-              <a:t>eleased monthly</a:t>
-            </a:r>
-          </a:p>
-          <a:p>
-            <a:pPr algn="l">
-              <a:buFont typeface="Arial" panose="020B0604020202020204" pitchFamily="34" charset="0"/>
-              <a:buChar char="•"/>
-            </a:pPr>
-            <a:r>
-              <a:rPr lang="en-US" sz="1800" b="0" i="0" dirty="0">
-                <a:solidFill>
-                  <a:schemeClr val="bg1"/>
-                </a:solidFill>
-                <a:effectLst/>
-              </a:rPr>
-              <a:t>Day 0 Support</a:t>
-            </a:r>
-          </a:p>
-          <a:p>
-            <a:pPr algn="l">
-              <a:buFont typeface="Arial" panose="020B0604020202020204" pitchFamily="34" charset="0"/>
-              <a:buChar char="•"/>
-            </a:pPr>
-            <a:r>
-              <a:rPr lang="en-US" sz="1800" b="0" i="0" dirty="0">
-                <a:solidFill>
-                  <a:schemeClr val="bg1"/>
-                </a:solidFill>
-                <a:effectLst/>
-              </a:rPr>
-              <a:t>Azure only</a:t>
+              <a:t> &lt; 1 Million</a:t>
             </a:r>
           </a:p>
           <a:p>
@@ -4157,17 +4124,18 @@
                   <a:schemeClr val="bg1"/>
                 </a:solidFill>
               </a:rPr>
-              <a:t>Registry Support</a:t>
-            </a:r>
-          </a:p>
-          <a:p>
-            <a:r>
-              <a:rPr lang="en-US" sz="1800" dirty="0">
+              <a:t>August `22 </a:t>
+            </a:r>
+          </a:p>
+          <a:p>
+            <a:pPr lvl="1"/>
+            <a:r>
+              <a:rPr lang="en-US" sz="1400" dirty="0">
                 <a:solidFill>
                   <a:schemeClr val="bg1"/>
                 </a:solidFill>
               </a:rPr>
-              <a:t>First Production release v 3.1 in March 2021</a:t>
+              <a:t>&gt; 11 Million</a:t>
             </a:r>
           </a:p>
         </p:txBody>
@@ -4251,10 +4219,372 @@
       </p:pic>
       <p:pic>
         <p:nvPicPr>
-          <p:cNvPr id="7174" name="Picture 6" descr="Project Bicep, the new ARM DSL from Microsoft - Plain Concepts">
-            <a:extLst>
-              <a:ext uri="{FF2B5EF4-FFF2-40B4-BE49-F238E27FC236}">
-                <a16:creationId xmlns:a16="http://schemas.microsoft.com/office/drawing/2014/main" id="{BCBF6348-5404-18CD-23D8-BB9498CB4A06}"/>
+          <p:cNvPr id="7" name="Picture 6" descr="QR Code for https://aka.ms/HeartlandDev22 &#10;Scan to follow along the examples and additional documentation">
+            <a:extLst>
+              <a:ext uri="{FF2B5EF4-FFF2-40B4-BE49-F238E27FC236}">
+                <a16:creationId xmlns:a16="http://schemas.microsoft.com/office/drawing/2014/main" id="{1155A42A-E5A7-AA0E-7FE5-F687DCE7A3B3}"/>
+              </a:ext>
+            </a:extLst>
+          </p:cNvPr>
+          <p:cNvPicPr>
+            <a:picLocks noChangeAspect="1"/>
+          </p:cNvPicPr>
+          <p:nvPr/>
+        </p:nvPicPr>
+        <p:blipFill>
+          <a:blip r:embed="rId4">
+            <a:extLst>
+              <a:ext uri="{28A0092B-C50C-407E-A947-70E740481C1C}">
+                <a14:useLocalDpi xmlns:a14="http://schemas.microsoft.com/office/drawing/2010/main" val="0"/>
+              </a:ext>
+            </a:extLst>
+          </a:blip>
+          <a:stretch>
+            <a:fillRect/>
+          </a:stretch>
+        </p:blipFill>
+        <p:spPr>
+          <a:xfrm>
+            <a:off x="11547718" y="6247392"/>
+            <a:ext cx="490965" cy="490965"/>
+          </a:xfrm>
+          <a:prstGeom prst="rect">
+            <a:avLst/>
+          </a:prstGeom>
+        </p:spPr>
+      </p:pic>
+      <p:sp>
+        <p:nvSpPr>
+          <p:cNvPr id="8" name="TextBox 7">
+            <a:extLst>
+              <a:ext uri="{FF2B5EF4-FFF2-40B4-BE49-F238E27FC236}">
+                <a16:creationId xmlns:a16="http://schemas.microsoft.com/office/drawing/2014/main" id="{BECA8AA3-1A0D-1648-E1B1-C19DD621A089}"/>
+              </a:ext>
+            </a:extLst>
+          </p:cNvPr>
+          <p:cNvSpPr txBox="1"/>
+          <p:nvPr/>
+        </p:nvSpPr>
+        <p:spPr>
+          <a:xfrm>
+            <a:off x="9530819" y="6337362"/>
+            <a:ext cx="2016899" cy="261610"/>
+          </a:xfrm>
+          <a:prstGeom prst="rect">
+            <a:avLst/>
+          </a:prstGeom>
+          <a:noFill/>
+        </p:spPr>
+        <p:txBody>
+          <a:bodyPr wrap="none" rtlCol="0">
+            <a:spAutoFit/>
+          </a:bodyPr>
+          <a:lstStyle/>
+          <a:p>
+            <a:pPr marL="0" marR="0" lvl="0" indent="0" algn="l" defTabSz="914400" rtl="0" eaLnBrk="1" fontAlgn="auto" latinLnBrk="0" hangingPunct="1">
+              <a:lnSpc>
+                <a:spcPct val="100000"/>
+              </a:lnSpc>
+              <a:spcBef>
+                <a:spcPts val="0"/>
+              </a:spcBef>
+              <a:spcAft>
+                <a:spcPts val="0"/>
+              </a:spcAft>
+              <a:buClrTx/>
+              <a:buSzTx/>
+              <a:buFontTx/>
+              <a:buNone/>
+              <a:tabLst/>
+              <a:defRPr/>
+            </a:pPr>
+            <a:r>
+              <a:rPr kumimoji="0" lang="en-US" sz="1100" b="0" i="0" u="none" strike="noStrike" kern="1200" cap="none" spc="0" normalizeH="0" baseline="0" noProof="0" dirty="0">
+                <a:ln>
+                  <a:noFill/>
+                </a:ln>
+                <a:solidFill>
+                  <a:srgbClr val="3E4AC4"/>
+                </a:solidFill>
+                <a:effectLst/>
+                <a:uLnTx/>
+                <a:uFillTx/>
+                <a:latin typeface="Calibri" panose="020F0502020204030204"/>
+                <a:ea typeface="+mn-ea"/>
+                <a:cs typeface="+mn-cs"/>
+              </a:rPr>
+              <a:t>https://aka.ms/HeartlandDev22</a:t>
+            </a:r>
+          </a:p>
+        </p:txBody>
+      </p:sp>
+      <p:pic>
+        <p:nvPicPr>
+          <p:cNvPr id="6" name="Picture 5">
+            <a:extLst>
+              <a:ext uri="{FF2B5EF4-FFF2-40B4-BE49-F238E27FC236}">
+                <a16:creationId xmlns:a16="http://schemas.microsoft.com/office/drawing/2014/main" id="{09D23D15-F121-7DC3-A923-0BCB790B47EC}"/>
+              </a:ext>
+            </a:extLst>
+          </p:cNvPr>
+          <p:cNvPicPr>
+            <a:picLocks noChangeAspect="1"/>
+          </p:cNvPicPr>
+          <p:nvPr/>
+        </p:nvPicPr>
+        <p:blipFill>
+          <a:blip r:embed="rId5"/>
+          <a:stretch>
+            <a:fillRect/>
+          </a:stretch>
+        </p:blipFill>
+        <p:spPr>
+          <a:xfrm>
+            <a:off x="5521418" y="2041637"/>
+            <a:ext cx="6388428" cy="3568883"/>
+          </a:xfrm>
+          <a:prstGeom prst="rect">
+            <a:avLst/>
+          </a:prstGeom>
+        </p:spPr>
+      </p:pic>
+    </p:spTree>
+    <p:extLst>
+      <p:ext uri="{BB962C8B-B14F-4D97-AF65-F5344CB8AC3E}">
+        <p14:creationId xmlns:p14="http://schemas.microsoft.com/office/powerpoint/2010/main" val="334856898"/>
+      </p:ext>
+    </p:extLst>
+  </p:cSld>
+  <p:clrMapOvr>
+    <a:masterClrMapping/>
+  </p:clrMapOvr>
+</p:sld>
+</file>
+
+<file path=ppt/slides/slide12.xml><?xml version="1.0" encoding="utf-8"?>
+<p:sld xmlns:a="http://schemas.openxmlformats.org/drawingml/2006/main" xmlns:r="http://schemas.openxmlformats.org/officeDocument/2006/relationships" xmlns:p="http://schemas.openxmlformats.org/presentationml/2006/main">
+  <p:cSld>
+    <p:bg>
+      <p:bgPr>
+        <a:solidFill>
+          <a:schemeClr val="accent1">
+            <a:alpha val="75000"/>
+          </a:schemeClr>
+        </a:solidFill>
+        <a:effectLst/>
+      </p:bgPr>
+    </p:bg>
+    <p:spTree>
+      <p:nvGrpSpPr>
+        <p:cNvPr id="1" name=""/>
+        <p:cNvGrpSpPr/>
+        <p:nvPr/>
+      </p:nvGrpSpPr>
+      <p:grpSpPr>
+        <a:xfrm>
+          <a:off x="0" y="0"/>
+          <a:ext cx="0" cy="0"/>
+          <a:chOff x="0" y="0"/>
+          <a:chExt cx="0" cy="0"/>
+        </a:xfrm>
+      </p:grpSpPr>
+      <p:sp>
+        <p:nvSpPr>
+          <p:cNvPr id="2" name="Title 1">
+            <a:extLst>
+              <a:ext uri="{FF2B5EF4-FFF2-40B4-BE49-F238E27FC236}">
+                <a16:creationId xmlns:a16="http://schemas.microsoft.com/office/drawing/2014/main" id="{6607947C-C54B-3B21-0650-03F96F7FF63A}"/>
+              </a:ext>
+            </a:extLst>
+          </p:cNvPr>
+          <p:cNvSpPr>
+            <a:spLocks noGrp="1"/>
+          </p:cNvSpPr>
+          <p:nvPr>
+            <p:ph type="title"/>
+          </p:nvPr>
+        </p:nvSpPr>
+        <p:spPr/>
+        <p:txBody>
+          <a:bodyPr/>
+          <a:lstStyle/>
+          <a:p>
+            <a:r>
+              <a:rPr lang="en-US" dirty="0">
+                <a:solidFill>
+                  <a:schemeClr val="bg1"/>
+                </a:solidFill>
+              </a:rPr>
+              <a:t>Azure Resource Manager Template (ARM)</a:t>
+            </a:r>
+          </a:p>
+        </p:txBody>
+      </p:sp>
+      <p:sp>
+        <p:nvSpPr>
+          <p:cNvPr id="3" name="Content Placeholder 2">
+            <a:extLst>
+              <a:ext uri="{FF2B5EF4-FFF2-40B4-BE49-F238E27FC236}">
+                <a16:creationId xmlns:a16="http://schemas.microsoft.com/office/drawing/2014/main" id="{55A95F38-D9A6-24A6-EAF1-9CDC8D36B1E7}"/>
+              </a:ext>
+            </a:extLst>
+          </p:cNvPr>
+          <p:cNvSpPr>
+            <a:spLocks noGrp="1"/>
+          </p:cNvSpPr>
+          <p:nvPr>
+            <p:ph idx="1"/>
+          </p:nvPr>
+        </p:nvSpPr>
+        <p:spPr/>
+        <p:txBody>
+          <a:bodyPr>
+            <a:normAutofit/>
+          </a:bodyPr>
+          <a:lstStyle/>
+          <a:p>
+            <a:pPr algn="l">
+              <a:buFont typeface="Arial" panose="020B0604020202020204" pitchFamily="34" charset="0"/>
+              <a:buChar char="•"/>
+            </a:pPr>
+            <a:r>
+              <a:rPr lang="en-US" sz="1800" b="0" i="0" dirty="0">
+                <a:solidFill>
+                  <a:schemeClr val="bg1"/>
+                </a:solidFill>
+                <a:effectLst/>
+              </a:rPr>
+              <a:t>JSON File Format</a:t>
+            </a:r>
+          </a:p>
+          <a:p>
+            <a:pPr algn="l">
+              <a:buFont typeface="Arial" panose="020B0604020202020204" pitchFamily="34" charset="0"/>
+              <a:buChar char="•"/>
+            </a:pPr>
+            <a:r>
+              <a:rPr lang="en-US" sz="1800" b="0" i="0" dirty="0">
+                <a:solidFill>
+                  <a:schemeClr val="bg1"/>
+                </a:solidFill>
+                <a:effectLst/>
+              </a:rPr>
+              <a:t>Explicitly track dependencies</a:t>
+            </a:r>
+          </a:p>
+          <a:p>
+            <a:pPr algn="l">
+              <a:buFont typeface="Arial" panose="020B0604020202020204" pitchFamily="34" charset="0"/>
+              <a:buChar char="•"/>
+            </a:pPr>
+            <a:r>
+              <a:rPr lang="en-US" sz="1800" b="0" i="0" dirty="0">
+                <a:solidFill>
+                  <a:schemeClr val="bg1"/>
+                </a:solidFill>
+                <a:effectLst/>
+              </a:rPr>
+              <a:t>Export from Azure</a:t>
+            </a:r>
+          </a:p>
+          <a:p>
+            <a:pPr algn="l">
+              <a:buFont typeface="Arial" panose="020B0604020202020204" pitchFamily="34" charset="0"/>
+              <a:buChar char="•"/>
+            </a:pPr>
+            <a:r>
+              <a:rPr lang="en-US" sz="1800" b="0" i="0" dirty="0">
+                <a:solidFill>
+                  <a:schemeClr val="bg1"/>
+                </a:solidFill>
+                <a:effectLst/>
+              </a:rPr>
+              <a:t>Day 0 Support</a:t>
+            </a:r>
+          </a:p>
+          <a:p>
+            <a:pPr algn="l">
+              <a:buFont typeface="Arial" panose="020B0604020202020204" pitchFamily="34" charset="0"/>
+              <a:buChar char="•"/>
+            </a:pPr>
+            <a:r>
+              <a:rPr lang="en-US" sz="1800" b="0" i="0" dirty="0">
+                <a:solidFill>
+                  <a:schemeClr val="bg1"/>
+                </a:solidFill>
+                <a:effectLst/>
+              </a:rPr>
+              <a:t>Azure specific</a:t>
+            </a:r>
+          </a:p>
+          <a:p>
+            <a:pPr algn="l">
+              <a:buFont typeface="Arial" panose="020B0604020202020204" pitchFamily="34" charset="0"/>
+              <a:buChar char="•"/>
+            </a:pPr>
+            <a:r>
+              <a:rPr lang="en-US" sz="1800" b="0" i="0" dirty="0">
+                <a:solidFill>
+                  <a:schemeClr val="bg1"/>
+                </a:solidFill>
+                <a:effectLst/>
+              </a:rPr>
+              <a:t>No state file</a:t>
+            </a:r>
+          </a:p>
+          <a:p>
+            <a:pPr algn="l">
+              <a:buFont typeface="Arial" panose="020B0604020202020204" pitchFamily="34" charset="0"/>
+              <a:buChar char="•"/>
+            </a:pPr>
+            <a:r>
+              <a:rPr lang="en-US" sz="1800" dirty="0">
+                <a:solidFill>
+                  <a:schemeClr val="bg1"/>
+                </a:solidFill>
+              </a:rPr>
+              <a:t>Native Tool</a:t>
+            </a:r>
+            <a:endParaRPr lang="en-US" dirty="0"/>
+          </a:p>
+        </p:txBody>
+      </p:sp>
+      <p:pic>
+        <p:nvPicPr>
+          <p:cNvPr id="6" name="Picture 5">
+            <a:extLst>
+              <a:ext uri="{FF2B5EF4-FFF2-40B4-BE49-F238E27FC236}">
+                <a16:creationId xmlns:a16="http://schemas.microsoft.com/office/drawing/2014/main" id="{C0C89A4B-F717-5653-704A-B88CE3A40230}"/>
+              </a:ext>
+            </a:extLst>
+          </p:cNvPr>
+          <p:cNvPicPr>
+            <a:picLocks noChangeAspect="1"/>
+          </p:cNvPicPr>
+          <p:nvPr/>
+        </p:nvPicPr>
+        <p:blipFill>
+          <a:blip r:embed="rId2"/>
+          <a:stretch>
+            <a:fillRect/>
+          </a:stretch>
+        </p:blipFill>
+        <p:spPr>
+          <a:xfrm>
+            <a:off x="0" y="1359047"/>
+            <a:ext cx="12192116" cy="45719"/>
+          </a:xfrm>
+          <a:prstGeom prst="rect">
+            <a:avLst/>
+          </a:prstGeom>
+        </p:spPr>
+      </p:pic>
+      <p:pic>
+        <p:nvPicPr>
+          <p:cNvPr id="6146" name="Picture 2" descr="Diagram illustrating Azure Consistent Management Layer">
+            <a:extLst>
+              <a:ext uri="{FF2B5EF4-FFF2-40B4-BE49-F238E27FC236}">
+                <a16:creationId xmlns:a16="http://schemas.microsoft.com/office/drawing/2014/main" id="{0E46109B-F337-BDAA-1FE7-88BA120683DA}"/>
               </a:ext>
             </a:extLst>
           </p:cNvPr>
@@ -4264,7 +4594,7 @@
           <p:nvPr/>
         </p:nvPicPr>
         <p:blipFill>
-          <a:blip r:embed="rId4">
+          <a:blip r:embed="rId3">
             <a:extLst>
               <a:ext uri="{28A0092B-C50C-407E-A947-70E740481C1C}">
                 <a14:useLocalDpi xmlns:a14="http://schemas.microsoft.com/office/drawing/2010/main" val="0"/>
@@ -4278,8 +4608,55 @@
         </p:blipFill>
         <p:spPr bwMode="auto">
           <a:xfrm>
-            <a:off x="6340030" y="2561548"/>
-            <a:ext cx="5400675" cy="3190875"/>
+            <a:off x="4737203" y="2011313"/>
+            <a:ext cx="7158621" cy="3767695"/>
+          </a:xfrm>
+          <a:prstGeom prst="rect">
+            <a:avLst/>
+          </a:prstGeom>
+          <a:noFill/>
+          <a:extLst>
+            <a:ext uri="{909E8E84-426E-40DD-AFC4-6F175D3DCCD1}">
+              <a14:hiddenFill xmlns:a14="http://schemas.microsoft.com/office/drawing/2010/main">
+                <a:solidFill>
+                  <a:srgbClr val="FFFFFF"/>
+                </a:solidFill>
+              </a14:hiddenFill>
+            </a:ext>
+          </a:extLst>
+        </p:spPr>
+      </p:pic>
+      <p:pic>
+        <p:nvPicPr>
+          <p:cNvPr id="6150" name="Picture 6" descr="Azure Resource Manager Logo">
+            <a:extLst>
+              <a:ext uri="{FF2B5EF4-FFF2-40B4-BE49-F238E27FC236}">
+                <a16:creationId xmlns:a16="http://schemas.microsoft.com/office/drawing/2014/main" id="{93C14F70-DEF1-B7B4-8B4F-FB421FDD0773}"/>
+              </a:ext>
+            </a:extLst>
+          </p:cNvPr>
+          <p:cNvPicPr>
+            <a:picLocks noChangeAspect="1" noChangeArrowheads="1"/>
+          </p:cNvPicPr>
+          <p:nvPr/>
+        </p:nvPicPr>
+        <p:blipFill>
+          <a:blip r:embed="rId4">
+            <a:extLst>
+              <a:ext uri="{28A0092B-C50C-407E-A947-70E740481C1C}">
+                <a14:useLocalDpi xmlns:a14="http://schemas.microsoft.com/office/drawing/2010/main" val="0"/>
+              </a:ext>
+            </a:extLst>
+          </a:blip>
+          <a:srcRect/>
+          <a:stretch>
+            <a:fillRect/>
+          </a:stretch>
+        </p:blipFill>
+        <p:spPr bwMode="auto">
+          <a:xfrm>
+            <a:off x="10602617" y="44499"/>
+            <a:ext cx="1502365" cy="1247080"/>
           </a:xfrm>
           <a:prstGeom prst="rect">
             <a:avLst/>
@@ -4301,7 +4678,7 @@
           <p:cNvPr id="7" name="Picture 6" descr="QR Code for https://aka.ms/HeartlandDev22 &#10;Scan to follow along the examples and additional documentation">
             <a:extLst>
               <a:ext uri="{FF2B5EF4-FFF2-40B4-BE49-F238E27FC236}">
-                <a16:creationId xmlns:a16="http://schemas.microsoft.com/office/drawing/2014/main" id="{1155A42A-E5A7-AA0E-7FE5-F687DCE7A3B3}"/>
+                <a16:creationId xmlns:a16="http://schemas.microsoft.com/office/drawing/2014/main" id="{E02F9D0B-C64D-55FF-E27C-1A2798D06D1A}"/>
               </a:ext>
             </a:extLst>
           </p:cNvPr>
@@ -4337,7 +4714,7 @@
           <p:cNvPr id="8" name="TextBox 7">
             <a:extLst>
               <a:ext uri="{FF2B5EF4-FFF2-40B4-BE49-F238E27FC236}">
-                <a16:creationId xmlns:a16="http://schemas.microsoft.com/office/drawing/2014/main" id="{BECA8AA3-1A0D-1648-E1B1-C19DD621A089}"/>
+                <a16:creationId xmlns:a16="http://schemas.microsoft.com/office/drawing/2014/main" id="{CCEA11BE-AE8F-AF2E-BC75-D2686C435D7D}"/>
               </a:ext>
             </a:extLst>
           </p:cNvPr>
@@ -4374,7 +4751,7 @@
     </p:spTree>
     <p:extLst>
       <p:ext uri="{BB962C8B-B14F-4D97-AF65-F5344CB8AC3E}">
-        <p14:creationId xmlns:p14="http://schemas.microsoft.com/office/powerpoint/2010/main" val="3053191635"/>
+        <p14:creationId xmlns:p14="http://schemas.microsoft.com/office/powerpoint/2010/main" val="606951253"/>
       </p:ext>
     </p:extLst>
   </p:cSld>
@@ -4384,7 +4761,7 @@
 </p:sld>
 </file>
 
-<file path=ppt/slides/slide12.xml><?xml version="1.0" encoding="utf-8"?>
+<file path=ppt/slides/slide13.xml><?xml version="1.0" encoding="utf-8"?>
 <p:sld xmlns:a="http://schemas.openxmlformats.org/drawingml/2006/main" xmlns:r="http://schemas.openxmlformats.org/officeDocument/2006/relationships" xmlns:p="http://schemas.openxmlformats.org/presentationml/2006/main">
   <p:cSld>
     <p:bg>
@@ -4784,7 +5161,7 @@
 </p:sld>
 </file>
 
-<file path=ppt/slides/slide13.xml><?xml version="1.0" encoding="utf-8"?>
+<file path=ppt/slides/slide14.xml><?xml version="1.0" encoding="utf-8"?>
 <p:sld xmlns:a="http://schemas.openxmlformats.org/drawingml/2006/main" xmlns:r="http://schemas.openxmlformats.org/officeDocument/2006/relationships" xmlns:p="http://schemas.openxmlformats.org/presentationml/2006/main">
   <p:cSld>
     <p:bg>
@@ -5236,7 +5613,7 @@
 </p:sld>
 </file>
 
-<file path=ppt/slides/slide14.xml><?xml version="1.0" encoding="utf-8"?>
+<file path=ppt/slides/slide15.xml><?xml version="1.0" encoding="utf-8"?>
 <p:sld xmlns:a="http://schemas.openxmlformats.org/drawingml/2006/main" xmlns:r="http://schemas.openxmlformats.org/officeDocument/2006/relationships" xmlns:p="http://schemas.openxmlformats.org/presentationml/2006/main">
   <p:cSld>
     <p:bg>
@@ -5337,7 +5714,7 @@
             <p:ph idx="1"/>
             <p:extLst>
               <p:ext uri="{D42A27DB-BD31-4B8C-83A1-F6EECF244321}">
-                <p14:modId xmlns:p14="http://schemas.microsoft.com/office/powerpoint/2010/main" val="1774416137"/>
+                <p14:modId xmlns:p14="http://schemas.microsoft.com/office/powerpoint/2010/main" val="3689787711"/>
               </p:ext>
             </p:extLst>
           </p:nvPr>
@@ -6587,7 +6964,7 @@
                       <a:r>
                         <a:rPr lang="en-US" sz="1800" kern="1200" dirty="0">
                           <a:solidFill>
-                            <a:srgbClr val="C00000"/>
+                            <a:schemeClr val="accent4"/>
                           </a:solidFill>
                           <a:latin typeface="Wingdings 2" panose="05020102010507070707" pitchFamily="18" charset="2"/>
                           <a:ea typeface="+mn-ea"/>
@@ -9030,7 +9407,7 @@
 </p:sld>
 </file>
 
-<file path=ppt/slides/slide15.xml><?xml version="1.0" encoding="utf-8"?>
+<file path=ppt/slides/slide16.xml><?xml version="1.0" encoding="utf-8"?>
 <p:sld xmlns:a="http://schemas.openxmlformats.org/drawingml/2006/main" xmlns:r="http://schemas.openxmlformats.org/officeDocument/2006/relationships" xmlns:p="http://schemas.openxmlformats.org/presentationml/2006/main">
   <p:cSld>
     <p:bg>
@@ -9333,6 +9710,16 @@
             </a:r>
           </a:p>
           <a:p>
+            <a:pPr indent="-228600">
+              <a:buFont typeface="Arial" panose="020B0604020202020204" pitchFamily="34" charset="0"/>
+              <a:buChar char="•"/>
+            </a:pPr>
+            <a:r>
+              <a:rPr lang="en-US" sz="3200" dirty="0"/>
+              <a:t>FEEDBACK, FEEDBACK, FEEDBACK</a:t>
+            </a:r>
+          </a:p>
+          <a:p>
             <a:endParaRPr lang="en-US" sz="1800" dirty="0"/>
           </a:p>
         </p:txBody>
@@ -9347,312 +9734,91 @@
   <p:clrMapOvr>
     <a:overrideClrMapping bg1="dk1" tx1="lt1" bg2="dk2" tx2="lt2" accent1="accent1" accent2="accent2" accent3="accent3" accent4="accent4" accent5="accent5" accent6="accent6" hlink="hlink" folHlink="folHlink"/>
   </p:clrMapOvr>
+  <p:timing>
+    <p:tnLst>
+      <p:par>
+        <p:cTn id="1" dur="indefinite" restart="never" nodeType="tmRoot">
+          <p:childTnLst>
+            <p:seq concurrent="1" nextAc="seek">
+              <p:cTn id="2" dur="indefinite" nodeType="mainSeq">
+                <p:childTnLst>
+                  <p:par>
+                    <p:cTn id="3" fill="hold">
+                      <p:stCondLst>
+                        <p:cond delay="indefinite"/>
+                      </p:stCondLst>
+                      <p:childTnLst>
+                        <p:par>
+                          <p:cTn id="4" fill="hold">
+                            <p:stCondLst>
+                              <p:cond delay="0"/>
+                            </p:stCondLst>
+                            <p:childTnLst>
+                              <p:par>
+                                <p:cTn id="5" presetID="1" presetClass="entr" presetSubtype="0" fill="hold" nodeType="clickEffect">
+                                  <p:stCondLst>
+                                    <p:cond delay="0"/>
+                                  </p:stCondLst>
+                                  <p:childTnLst>
+                                    <p:set>
+                                      <p:cBhvr>
+                                        <p:cTn id="6" dur="1" fill="hold">
+                                          <p:stCondLst>
+                                            <p:cond delay="0"/>
+                                          </p:stCondLst>
+                                        </p:cTn>
+                                        <p:tgtEl>
+                                          <p:spTgt spid="4">
+                                            <p:txEl>
+                                              <p:pRg st="1" end="1"/>
+                                            </p:txEl>
+                                          </p:spTgt>
+                                        </p:tgtEl>
+                                        <p:attrNameLst>
+                                          <p:attrName>style.visibility</p:attrName>
+                                        </p:attrNameLst>
+                                      </p:cBhvr>
+                                      <p:to>
+                                        <p:strVal val="visible"/>
+                                      </p:to>
+                                    </p:set>
+                                  </p:childTnLst>
+                                </p:cTn>
+                              </p:par>
+                            </p:childTnLst>
+                          </p:cTn>
+                        </p:par>
+                      </p:childTnLst>
+                    </p:cTn>
+                  </p:par>
+                </p:childTnLst>
+              </p:cTn>
+              <p:prevCondLst>
+                <p:cond evt="onPrev" delay="0">
+                  <p:tgtEl>
+                    <p:sldTgt/>
+                  </p:tgtEl>
+                </p:cond>
+              </p:prevCondLst>
+              <p:nextCondLst>
+                <p:cond evt="onNext" delay="0">
+                  <p:tgtEl>
+                    <p:sldTgt/>
+                  </p:tgtEl>
+                </p:cond>
+              </p:nextCondLst>
+            </p:seq>
+          </p:childTnLst>
+        </p:cTn>
+      </p:par>
+    </p:tnLst>
+  </p:timing>
 </p:sld>
 </file>
 
-<file path=ppt/slides/slide2.xml><?xml version="1.0" encoding="utf-8"?>
+<file path=ppt/slides/slide17.xml><?xml version="1.0" encoding="utf-8"?>
 <p:sld xmlns:a="http://schemas.openxmlformats.org/drawingml/2006/main" xmlns:r="http://schemas.openxmlformats.org/officeDocument/2006/relationships" xmlns:p="http://schemas.openxmlformats.org/presentationml/2006/main">
   <p:cSld>
-    <p:bg>
-      <p:bgPr>
-        <a:solidFill>
-          <a:srgbClr val="FFFEE1">
-            <a:alpha val="75000"/>
-          </a:srgbClr>
-        </a:solidFill>
-        <a:effectLst/>
-      </p:bgPr>
-    </p:bg>
-    <p:spTree>
-      <p:nvGrpSpPr>
-        <p:cNvPr id="1" name=""/>
-        <p:cNvGrpSpPr/>
-        <p:nvPr/>
-      </p:nvGrpSpPr>
-      <p:grpSpPr>
-        <a:xfrm>
-          <a:off x="0" y="0"/>
-          <a:ext cx="0" cy="0"/>
-          <a:chOff x="0" y="0"/>
-          <a:chExt cx="0" cy="0"/>
-        </a:xfrm>
-      </p:grpSpPr>
-      <p:sp>
-        <p:nvSpPr>
-          <p:cNvPr id="2" name="Title 1">
-            <a:extLst>
-              <a:ext uri="{FF2B5EF4-FFF2-40B4-BE49-F238E27FC236}">
-                <a16:creationId xmlns:a16="http://schemas.microsoft.com/office/drawing/2014/main" id="{04461E79-CD2A-666E-B6CE-6F570AFDF8D1}"/>
-              </a:ext>
-            </a:extLst>
-          </p:cNvPr>
-          <p:cNvSpPr>
-            <a:spLocks noGrp="1"/>
-          </p:cNvSpPr>
-          <p:nvPr>
-            <p:ph type="title"/>
-          </p:nvPr>
-        </p:nvSpPr>
-        <p:spPr/>
-        <p:txBody>
-          <a:bodyPr/>
-          <a:lstStyle/>
-          <a:p>
-            <a:r>
-              <a:rPr lang="en-US" dirty="0"/>
-              <a:t>Audience</a:t>
-            </a:r>
-          </a:p>
-        </p:txBody>
-      </p:sp>
-      <p:sp>
-        <p:nvSpPr>
-          <p:cNvPr id="3" name="Content Placeholder 2">
-            <a:extLst>
-              <a:ext uri="{FF2B5EF4-FFF2-40B4-BE49-F238E27FC236}">
-                <a16:creationId xmlns:a16="http://schemas.microsoft.com/office/drawing/2014/main" id="{3327FB94-F2C7-6945-3A04-546B6096977C}"/>
-              </a:ext>
-            </a:extLst>
-          </p:cNvPr>
-          <p:cNvSpPr>
-            <a:spLocks noGrp="1"/>
-          </p:cNvSpPr>
-          <p:nvPr>
-            <p:ph idx="1"/>
-          </p:nvPr>
-        </p:nvSpPr>
-        <p:spPr/>
-        <p:txBody>
-          <a:bodyPr/>
-          <a:lstStyle/>
-          <a:p>
-            <a:r>
-              <a:rPr lang="en-US" dirty="0"/>
-              <a:t>Anyone new to Infrastructure as Code (</a:t>
-            </a:r>
-            <a:r>
-              <a:rPr lang="en-US" dirty="0" err="1"/>
-              <a:t>IaC</a:t>
-            </a:r>
-            <a:r>
-              <a:rPr lang="en-US" dirty="0"/>
-              <a:t>)</a:t>
-            </a:r>
-          </a:p>
-          <a:p>
-            <a:r>
-              <a:rPr lang="en-US" dirty="0"/>
-              <a:t>Those experienced in one language of </a:t>
-            </a:r>
-            <a:r>
-              <a:rPr lang="en-US" dirty="0" err="1"/>
-              <a:t>IaC</a:t>
-            </a:r>
-            <a:r>
-              <a:rPr lang="en-US" dirty="0"/>
-              <a:t> and want to learn more</a:t>
-            </a:r>
-          </a:p>
-          <a:p>
-            <a:r>
-              <a:rPr lang="en-US" dirty="0"/>
-              <a:t>Curious to Learn something new</a:t>
-            </a:r>
-          </a:p>
-          <a:p>
-            <a:r>
-              <a:rPr lang="en-US" dirty="0"/>
-              <a:t>Interested to see how </a:t>
-            </a:r>
-            <a:r>
-              <a:rPr lang="en-US" dirty="0" err="1"/>
-              <a:t>IaC</a:t>
-            </a:r>
-            <a:r>
-              <a:rPr lang="en-US" dirty="0"/>
-              <a:t> Resources can be deployed</a:t>
-            </a:r>
-          </a:p>
-        </p:txBody>
-      </p:sp>
-      <p:pic>
-        <p:nvPicPr>
-          <p:cNvPr id="1026" name="Picture 2" descr="35 Making Homemade Ice Cream Illustrations &amp; Clip Art - iStock">
-            <a:extLst>
-              <a:ext uri="{FF2B5EF4-FFF2-40B4-BE49-F238E27FC236}">
-                <a16:creationId xmlns:a16="http://schemas.microsoft.com/office/drawing/2014/main" id="{AF7CB06A-3914-4C15-0386-C4B708E8805C}"/>
-              </a:ext>
-            </a:extLst>
-          </p:cNvPr>
-          <p:cNvPicPr>
-            <a:picLocks noChangeAspect="1" noChangeArrowheads="1"/>
-          </p:cNvPicPr>
-          <p:nvPr/>
-        </p:nvPicPr>
-        <p:blipFill>
-          <a:blip r:embed="rId2">
-            <a:extLst>
-              <a:ext uri="{28A0092B-C50C-407E-A947-70E740481C1C}">
-                <a14:useLocalDpi xmlns:a14="http://schemas.microsoft.com/office/drawing/2010/main" val="0"/>
-              </a:ext>
-            </a:extLst>
-          </a:blip>
-          <a:srcRect/>
-          <a:stretch>
-            <a:fillRect/>
-          </a:stretch>
-        </p:blipFill>
-        <p:spPr bwMode="auto">
-          <a:xfrm>
-            <a:off x="6712279" y="4512106"/>
-            <a:ext cx="5479721" cy="2345894"/>
-          </a:xfrm>
-          <a:prstGeom prst="rect">
-            <a:avLst/>
-          </a:prstGeom>
-          <a:noFill/>
-          <a:extLst>
-            <a:ext uri="{909E8E84-426E-40DD-AFC4-6F175D3DCCD1}">
-              <a14:hiddenFill xmlns:a14="http://schemas.microsoft.com/office/drawing/2010/main">
-                <a:solidFill>
-                  <a:srgbClr val="FFFFFF"/>
-                </a:solidFill>
-              </a14:hiddenFill>
-            </a:ext>
-          </a:extLst>
-        </p:spPr>
-      </p:pic>
-      <p:pic>
-        <p:nvPicPr>
-          <p:cNvPr id="5" name="Picture 4">
-            <a:extLst>
-              <a:ext uri="{FF2B5EF4-FFF2-40B4-BE49-F238E27FC236}">
-                <a16:creationId xmlns:a16="http://schemas.microsoft.com/office/drawing/2014/main" id="{C8D90802-54DD-4D8E-1288-B990DD15DC9A}"/>
-              </a:ext>
-            </a:extLst>
-          </p:cNvPr>
-          <p:cNvPicPr>
-            <a:picLocks noChangeAspect="1"/>
-          </p:cNvPicPr>
-          <p:nvPr/>
-        </p:nvPicPr>
-        <p:blipFill>
-          <a:blip r:embed="rId3"/>
-          <a:stretch>
-            <a:fillRect/>
-          </a:stretch>
-        </p:blipFill>
-        <p:spPr>
-          <a:xfrm>
-            <a:off x="0" y="1319455"/>
-            <a:ext cx="12192000" cy="103828"/>
-          </a:xfrm>
-          <a:prstGeom prst="rect">
-            <a:avLst/>
-          </a:prstGeom>
-        </p:spPr>
-      </p:pic>
-      <p:pic>
-        <p:nvPicPr>
-          <p:cNvPr id="6" name="Picture 5" descr="QR Code for https://aka.ms/HeartlandDev22 &#10;Scan to follow along the examples and additional documentation">
-            <a:extLst>
-              <a:ext uri="{FF2B5EF4-FFF2-40B4-BE49-F238E27FC236}">
-                <a16:creationId xmlns:a16="http://schemas.microsoft.com/office/drawing/2014/main" id="{CB9ABBDC-EA25-D893-B162-876448EAEE17}"/>
-              </a:ext>
-            </a:extLst>
-          </p:cNvPr>
-          <p:cNvPicPr>
-            <a:picLocks noChangeAspect="1"/>
-          </p:cNvPicPr>
-          <p:nvPr/>
-        </p:nvPicPr>
-        <p:blipFill>
-          <a:blip r:embed="rId4">
-            <a:extLst>
-              <a:ext uri="{28A0092B-C50C-407E-A947-70E740481C1C}">
-                <a14:useLocalDpi xmlns:a14="http://schemas.microsoft.com/office/drawing/2010/main" val="0"/>
-              </a:ext>
-            </a:extLst>
-          </a:blip>
-          <a:stretch>
-            <a:fillRect/>
-          </a:stretch>
-        </p:blipFill>
-        <p:spPr>
-          <a:xfrm>
-            <a:off x="11701035" y="0"/>
-            <a:ext cx="490965" cy="490965"/>
-          </a:xfrm>
-          <a:prstGeom prst="rect">
-            <a:avLst/>
-          </a:prstGeom>
-        </p:spPr>
-      </p:pic>
-      <p:sp>
-        <p:nvSpPr>
-          <p:cNvPr id="7" name="TextBox 6">
-            <a:extLst>
-              <a:ext uri="{FF2B5EF4-FFF2-40B4-BE49-F238E27FC236}">
-                <a16:creationId xmlns:a16="http://schemas.microsoft.com/office/drawing/2014/main" id="{33B8F789-3708-DDDA-E304-08775B9ACC38}"/>
-              </a:ext>
-            </a:extLst>
-          </p:cNvPr>
-          <p:cNvSpPr txBox="1"/>
-          <p:nvPr/>
-        </p:nvSpPr>
-        <p:spPr>
-          <a:xfrm>
-            <a:off x="9684136" y="89970"/>
-            <a:ext cx="2016899" cy="261610"/>
-          </a:xfrm>
-          <a:prstGeom prst="rect">
-            <a:avLst/>
-          </a:prstGeom>
-          <a:noFill/>
-        </p:spPr>
-        <p:txBody>
-          <a:bodyPr wrap="none" rtlCol="0">
-            <a:spAutoFit/>
-          </a:bodyPr>
-          <a:lstStyle/>
-          <a:p>
-            <a:r>
-              <a:rPr lang="en-US" sz="1100" dirty="0">
-                <a:solidFill>
-                  <a:srgbClr val="3E4AC4"/>
-                </a:solidFill>
-              </a:rPr>
-              <a:t>https://aka.ms/HeartlandDev22</a:t>
-            </a:r>
-          </a:p>
-        </p:txBody>
-      </p:sp>
-    </p:spTree>
-    <p:extLst>
-      <p:ext uri="{BB962C8B-B14F-4D97-AF65-F5344CB8AC3E}">
-        <p14:creationId xmlns:p14="http://schemas.microsoft.com/office/powerpoint/2010/main" val="2924000461"/>
-      </p:ext>
-    </p:extLst>
-  </p:cSld>
-  <p:clrMapOvr>
-    <a:masterClrMapping/>
-  </p:clrMapOvr>
-</p:sld>
-</file>
-
-<file path=ppt/slides/slide3.xml><?xml version="1.0" encoding="utf-8"?>
-<p:sld xmlns:a="http://schemas.openxmlformats.org/drawingml/2006/main" xmlns:r="http://schemas.openxmlformats.org/officeDocument/2006/relationships" xmlns:p="http://schemas.openxmlformats.org/presentationml/2006/main">
-  <p:cSld>
-    <p:bg>
-      <p:bgPr>
-        <a:solidFill>
-          <a:srgbClr val="FFFEE1">
-            <a:alpha val="75000"/>
-          </a:srgbClr>
-        </a:solidFill>
-        <a:effectLst/>
-      </p:bgPr>
-    </p:bg>
     <p:spTree>
       <p:nvGrpSpPr>
         <p:cNvPr id="1" name=""/>
@@ -10281,6 +10447,1452 @@
           </a:p>
         </p:txBody>
       </p:sp>
+      <p:pic>
+        <p:nvPicPr>
+          <p:cNvPr id="8" name="Picture 2" descr="Linkedin - Free social media icons">
+            <a:hlinkClick r:id="rId12"/>
+            <a:extLst>
+              <a:ext uri="{FF2B5EF4-FFF2-40B4-BE49-F238E27FC236}">
+                <a16:creationId xmlns:a16="http://schemas.microsoft.com/office/drawing/2014/main" id="{5BDAE7A1-3E2A-A221-0C36-597E9468D50E}"/>
+              </a:ext>
+            </a:extLst>
+          </p:cNvPr>
+          <p:cNvPicPr>
+            <a:picLocks noChangeAspect="1" noChangeArrowheads="1"/>
+          </p:cNvPicPr>
+          <p:nvPr/>
+        </p:nvPicPr>
+        <p:blipFill>
+          <a:blip r:embed="rId13">
+            <a:extLst>
+              <a:ext uri="{28A0092B-C50C-407E-A947-70E740481C1C}">
+                <a14:useLocalDpi xmlns:a14="http://schemas.microsoft.com/office/drawing/2010/main" val="0"/>
+              </a:ext>
+            </a:extLst>
+          </a:blip>
+          <a:srcRect/>
+          <a:stretch>
+            <a:fillRect/>
+          </a:stretch>
+        </p:blipFill>
+        <p:spPr bwMode="auto">
+          <a:xfrm>
+            <a:off x="629867" y="2325647"/>
+            <a:ext cx="161389" cy="161389"/>
+          </a:xfrm>
+          <a:prstGeom prst="rect">
+            <a:avLst/>
+          </a:prstGeom>
+          <a:noFill/>
+          <a:extLst>
+            <a:ext uri="{909E8E84-426E-40DD-AFC4-6F175D3DCCD1}">
+              <a14:hiddenFill xmlns:a14="http://schemas.microsoft.com/office/drawing/2010/main">
+                <a:solidFill>
+                  <a:srgbClr val="FFFFFF"/>
+                </a:solidFill>
+              </a14:hiddenFill>
+            </a:ext>
+          </a:extLst>
+        </p:spPr>
+      </p:pic>
+      <p:sp>
+        <p:nvSpPr>
+          <p:cNvPr id="10" name="TextBox 9">
+            <a:extLst>
+              <a:ext uri="{FF2B5EF4-FFF2-40B4-BE49-F238E27FC236}">
+                <a16:creationId xmlns:a16="http://schemas.microsoft.com/office/drawing/2014/main" id="{4B4DCEC8-1F63-6023-8629-BA82C8359998}"/>
+              </a:ext>
+            </a:extLst>
+          </p:cNvPr>
+          <p:cNvSpPr txBox="1"/>
+          <p:nvPr/>
+        </p:nvSpPr>
+        <p:spPr>
+          <a:xfrm>
+            <a:off x="749424" y="2295730"/>
+            <a:ext cx="821927" cy="215444"/>
+          </a:xfrm>
+          <a:prstGeom prst="rect">
+            <a:avLst/>
+          </a:prstGeom>
+          <a:noFill/>
+        </p:spPr>
+        <p:txBody>
+          <a:bodyPr wrap="square" rtlCol="0">
+            <a:spAutoFit/>
+          </a:bodyPr>
+          <a:lstStyle/>
+          <a:p>
+            <a:r>
+              <a:rPr lang="en-US" sz="800" dirty="0"/>
+              <a:t>John-Folberth</a:t>
+            </a:r>
+          </a:p>
+        </p:txBody>
+      </p:sp>
+      <p:pic>
+        <p:nvPicPr>
+          <p:cNvPr id="12" name="Picture 4" descr="Github Logo - Free social media icons">
+            <a:hlinkClick r:id="rId14"/>
+            <a:extLst>
+              <a:ext uri="{FF2B5EF4-FFF2-40B4-BE49-F238E27FC236}">
+                <a16:creationId xmlns:a16="http://schemas.microsoft.com/office/drawing/2014/main" id="{207F9767-DE1C-7C00-0A2E-86540022E6C1}"/>
+              </a:ext>
+            </a:extLst>
+          </p:cNvPr>
+          <p:cNvPicPr>
+            <a:picLocks noChangeAspect="1" noChangeArrowheads="1"/>
+          </p:cNvPicPr>
+          <p:nvPr/>
+        </p:nvPicPr>
+        <p:blipFill>
+          <a:blip r:embed="rId15">
+            <a:extLst>
+              <a:ext uri="{28A0092B-C50C-407E-A947-70E740481C1C}">
+                <a14:useLocalDpi xmlns:a14="http://schemas.microsoft.com/office/drawing/2010/main" val="0"/>
+              </a:ext>
+            </a:extLst>
+          </a:blip>
+          <a:srcRect/>
+          <a:stretch>
+            <a:fillRect/>
+          </a:stretch>
+        </p:blipFill>
+        <p:spPr bwMode="auto">
+          <a:xfrm>
+            <a:off x="1481435" y="2316838"/>
+            <a:ext cx="161389" cy="161389"/>
+          </a:xfrm>
+          <a:prstGeom prst="rect">
+            <a:avLst/>
+          </a:prstGeom>
+          <a:noFill/>
+          <a:extLst>
+            <a:ext uri="{909E8E84-426E-40DD-AFC4-6F175D3DCCD1}">
+              <a14:hiddenFill xmlns:a14="http://schemas.microsoft.com/office/drawing/2010/main">
+                <a:solidFill>
+                  <a:srgbClr val="FFFFFF"/>
+                </a:solidFill>
+              </a14:hiddenFill>
+            </a:ext>
+          </a:extLst>
+        </p:spPr>
+      </p:pic>
+      <p:sp>
+        <p:nvSpPr>
+          <p:cNvPr id="13" name="TextBox 12">
+            <a:extLst>
+              <a:ext uri="{FF2B5EF4-FFF2-40B4-BE49-F238E27FC236}">
+                <a16:creationId xmlns:a16="http://schemas.microsoft.com/office/drawing/2014/main" id="{C98CF1FE-09AA-5871-3610-5E774CD91EE8}"/>
+              </a:ext>
+            </a:extLst>
+          </p:cNvPr>
+          <p:cNvSpPr txBox="1"/>
+          <p:nvPr/>
+        </p:nvSpPr>
+        <p:spPr>
+          <a:xfrm>
+            <a:off x="1639776" y="2287412"/>
+            <a:ext cx="821927" cy="215444"/>
+          </a:xfrm>
+          <a:prstGeom prst="rect">
+            <a:avLst/>
+          </a:prstGeom>
+          <a:noFill/>
+        </p:spPr>
+        <p:txBody>
+          <a:bodyPr wrap="square" rtlCol="0">
+            <a:spAutoFit/>
+          </a:bodyPr>
+          <a:lstStyle/>
+          <a:p>
+            <a:r>
+              <a:rPr lang="en-US" sz="800" dirty="0" err="1"/>
+              <a:t>JFolberth</a:t>
+            </a:r>
+            <a:endParaRPr lang="en-US" sz="800" dirty="0"/>
+          </a:p>
+        </p:txBody>
+      </p:sp>
+      <p:pic>
+        <p:nvPicPr>
+          <p:cNvPr id="15" name="Picture 6" descr="Twitter - Free social media icons">
+            <a:hlinkClick r:id="rId16"/>
+            <a:extLst>
+              <a:ext uri="{FF2B5EF4-FFF2-40B4-BE49-F238E27FC236}">
+                <a16:creationId xmlns:a16="http://schemas.microsoft.com/office/drawing/2014/main" id="{956A9F8F-1F43-C6AA-AB7F-C4F0E54638E4}"/>
+              </a:ext>
+            </a:extLst>
+          </p:cNvPr>
+          <p:cNvPicPr>
+            <a:picLocks noChangeAspect="1" noChangeArrowheads="1"/>
+          </p:cNvPicPr>
+          <p:nvPr/>
+        </p:nvPicPr>
+        <p:blipFill>
+          <a:blip r:embed="rId17">
+            <a:extLst>
+              <a:ext uri="{28A0092B-C50C-407E-A947-70E740481C1C}">
+                <a14:useLocalDpi xmlns:a14="http://schemas.microsoft.com/office/drawing/2010/main" val="0"/>
+              </a:ext>
+            </a:extLst>
+          </a:blip>
+          <a:srcRect/>
+          <a:stretch>
+            <a:fillRect/>
+          </a:stretch>
+        </p:blipFill>
+        <p:spPr bwMode="auto">
+          <a:xfrm>
+            <a:off x="2240559" y="2309215"/>
+            <a:ext cx="161390" cy="161390"/>
+          </a:xfrm>
+          <a:prstGeom prst="rect">
+            <a:avLst/>
+          </a:prstGeom>
+          <a:noFill/>
+          <a:extLst>
+            <a:ext uri="{909E8E84-426E-40DD-AFC4-6F175D3DCCD1}">
+              <a14:hiddenFill xmlns:a14="http://schemas.microsoft.com/office/drawing/2010/main">
+                <a:solidFill>
+                  <a:srgbClr val="FFFFFF"/>
+                </a:solidFill>
+              </a14:hiddenFill>
+            </a:ext>
+          </a:extLst>
+        </p:spPr>
+      </p:pic>
+      <p:sp>
+        <p:nvSpPr>
+          <p:cNvPr id="19" name="TextBox 18">
+            <a:extLst>
+              <a:ext uri="{FF2B5EF4-FFF2-40B4-BE49-F238E27FC236}">
+                <a16:creationId xmlns:a16="http://schemas.microsoft.com/office/drawing/2014/main" id="{2E8D36F4-CEFA-2C77-C73B-BF48C53818BE}"/>
+              </a:ext>
+            </a:extLst>
+          </p:cNvPr>
+          <p:cNvSpPr txBox="1"/>
+          <p:nvPr/>
+        </p:nvSpPr>
+        <p:spPr>
+          <a:xfrm>
+            <a:off x="2398899" y="2277046"/>
+            <a:ext cx="821927" cy="215444"/>
+          </a:xfrm>
+          <a:prstGeom prst="rect">
+            <a:avLst/>
+          </a:prstGeom>
+          <a:noFill/>
+        </p:spPr>
+        <p:txBody>
+          <a:bodyPr wrap="square" rtlCol="0">
+            <a:spAutoFit/>
+          </a:bodyPr>
+          <a:lstStyle/>
+          <a:p>
+            <a:r>
+              <a:rPr lang="en-US" sz="800" dirty="0" err="1"/>
+              <a:t>j_Folberth</a:t>
+            </a:r>
+            <a:endParaRPr lang="en-US" sz="800" dirty="0"/>
+          </a:p>
+        </p:txBody>
+      </p:sp>
+    </p:spTree>
+    <p:extLst>
+      <p:ext uri="{BB962C8B-B14F-4D97-AF65-F5344CB8AC3E}">
+        <p14:creationId xmlns:p14="http://schemas.microsoft.com/office/powerpoint/2010/main" val="3829326809"/>
+      </p:ext>
+    </p:extLst>
+  </p:cSld>
+  <p:clrMapOvr>
+    <a:masterClrMapping/>
+  </p:clrMapOvr>
+</p:sld>
+</file>
+
+<file path=ppt/slides/slide2.xml><?xml version="1.0" encoding="utf-8"?>
+<p:sld xmlns:a="http://schemas.openxmlformats.org/drawingml/2006/main" xmlns:r="http://schemas.openxmlformats.org/officeDocument/2006/relationships" xmlns:p="http://schemas.openxmlformats.org/presentationml/2006/main">
+  <p:cSld>
+    <p:bg>
+      <p:bgPr>
+        <a:solidFill>
+          <a:srgbClr val="FFFEE1">
+            <a:alpha val="75000"/>
+          </a:srgbClr>
+        </a:solidFill>
+        <a:effectLst/>
+      </p:bgPr>
+    </p:bg>
+    <p:spTree>
+      <p:nvGrpSpPr>
+        <p:cNvPr id="1" name=""/>
+        <p:cNvGrpSpPr/>
+        <p:nvPr/>
+      </p:nvGrpSpPr>
+      <p:grpSpPr>
+        <a:xfrm>
+          <a:off x="0" y="0"/>
+          <a:ext cx="0" cy="0"/>
+          <a:chOff x="0" y="0"/>
+          <a:chExt cx="0" cy="0"/>
+        </a:xfrm>
+      </p:grpSpPr>
+      <p:sp>
+        <p:nvSpPr>
+          <p:cNvPr id="2" name="Title 1">
+            <a:extLst>
+              <a:ext uri="{FF2B5EF4-FFF2-40B4-BE49-F238E27FC236}">
+                <a16:creationId xmlns:a16="http://schemas.microsoft.com/office/drawing/2014/main" id="{04461E79-CD2A-666E-B6CE-6F570AFDF8D1}"/>
+              </a:ext>
+            </a:extLst>
+          </p:cNvPr>
+          <p:cNvSpPr>
+            <a:spLocks noGrp="1"/>
+          </p:cNvSpPr>
+          <p:nvPr>
+            <p:ph type="title"/>
+          </p:nvPr>
+        </p:nvSpPr>
+        <p:spPr/>
+        <p:txBody>
+          <a:bodyPr/>
+          <a:lstStyle/>
+          <a:p>
+            <a:r>
+              <a:rPr lang="en-US" dirty="0"/>
+              <a:t>Audience</a:t>
+            </a:r>
+          </a:p>
+        </p:txBody>
+      </p:sp>
+      <p:sp>
+        <p:nvSpPr>
+          <p:cNvPr id="3" name="Content Placeholder 2">
+            <a:extLst>
+              <a:ext uri="{FF2B5EF4-FFF2-40B4-BE49-F238E27FC236}">
+                <a16:creationId xmlns:a16="http://schemas.microsoft.com/office/drawing/2014/main" id="{3327FB94-F2C7-6945-3A04-546B6096977C}"/>
+              </a:ext>
+            </a:extLst>
+          </p:cNvPr>
+          <p:cNvSpPr>
+            <a:spLocks noGrp="1"/>
+          </p:cNvSpPr>
+          <p:nvPr>
+            <p:ph idx="1"/>
+          </p:nvPr>
+        </p:nvSpPr>
+        <p:spPr/>
+        <p:txBody>
+          <a:bodyPr/>
+          <a:lstStyle/>
+          <a:p>
+            <a:r>
+              <a:rPr lang="en-US" dirty="0"/>
+              <a:t>Anyone new to Infrastructure as Code (</a:t>
+            </a:r>
+            <a:r>
+              <a:rPr lang="en-US" dirty="0" err="1"/>
+              <a:t>IaC</a:t>
+            </a:r>
+            <a:r>
+              <a:rPr lang="en-US" dirty="0"/>
+              <a:t>)</a:t>
+            </a:r>
+          </a:p>
+          <a:p>
+            <a:r>
+              <a:rPr lang="en-US" dirty="0"/>
+              <a:t>Those experienced in one language of </a:t>
+            </a:r>
+            <a:r>
+              <a:rPr lang="en-US" dirty="0" err="1"/>
+              <a:t>IaC</a:t>
+            </a:r>
+            <a:r>
+              <a:rPr lang="en-US" dirty="0"/>
+              <a:t> and want to learn more</a:t>
+            </a:r>
+          </a:p>
+          <a:p>
+            <a:r>
+              <a:rPr lang="en-US" dirty="0"/>
+              <a:t>Curious to learn something new</a:t>
+            </a:r>
+          </a:p>
+          <a:p>
+            <a:r>
+              <a:rPr lang="en-US" dirty="0"/>
+              <a:t>Interested to see how </a:t>
+            </a:r>
+            <a:r>
+              <a:rPr lang="en-US" dirty="0" err="1"/>
+              <a:t>IaC</a:t>
+            </a:r>
+            <a:r>
+              <a:rPr lang="en-US" dirty="0"/>
+              <a:t> Resources can be deployed</a:t>
+            </a:r>
+          </a:p>
+        </p:txBody>
+      </p:sp>
+      <p:pic>
+        <p:nvPicPr>
+          <p:cNvPr id="1026" name="Picture 2" descr="35 Making Homemade Ice Cream Illustrations &amp; Clip Art - iStock">
+            <a:extLst>
+              <a:ext uri="{FF2B5EF4-FFF2-40B4-BE49-F238E27FC236}">
+                <a16:creationId xmlns:a16="http://schemas.microsoft.com/office/drawing/2014/main" id="{AF7CB06A-3914-4C15-0386-C4B708E8805C}"/>
+              </a:ext>
+            </a:extLst>
+          </p:cNvPr>
+          <p:cNvPicPr>
+            <a:picLocks noChangeAspect="1" noChangeArrowheads="1"/>
+          </p:cNvPicPr>
+          <p:nvPr/>
+        </p:nvPicPr>
+        <p:blipFill>
+          <a:blip r:embed="rId2">
+            <a:extLst>
+              <a:ext uri="{28A0092B-C50C-407E-A947-70E740481C1C}">
+                <a14:useLocalDpi xmlns:a14="http://schemas.microsoft.com/office/drawing/2010/main" val="0"/>
+              </a:ext>
+            </a:extLst>
+          </a:blip>
+          <a:srcRect/>
+          <a:stretch>
+            <a:fillRect/>
+          </a:stretch>
+        </p:blipFill>
+        <p:spPr bwMode="auto">
+          <a:xfrm>
+            <a:off x="6712279" y="4512106"/>
+            <a:ext cx="5479721" cy="2345894"/>
+          </a:xfrm>
+          <a:prstGeom prst="rect">
+            <a:avLst/>
+          </a:prstGeom>
+          <a:noFill/>
+          <a:extLst>
+            <a:ext uri="{909E8E84-426E-40DD-AFC4-6F175D3DCCD1}">
+              <a14:hiddenFill xmlns:a14="http://schemas.microsoft.com/office/drawing/2010/main">
+                <a:solidFill>
+                  <a:srgbClr val="FFFFFF"/>
+                </a:solidFill>
+              </a14:hiddenFill>
+            </a:ext>
+          </a:extLst>
+        </p:spPr>
+      </p:pic>
+      <p:pic>
+        <p:nvPicPr>
+          <p:cNvPr id="5" name="Picture 4">
+            <a:extLst>
+              <a:ext uri="{FF2B5EF4-FFF2-40B4-BE49-F238E27FC236}">
+                <a16:creationId xmlns:a16="http://schemas.microsoft.com/office/drawing/2014/main" id="{C8D90802-54DD-4D8E-1288-B990DD15DC9A}"/>
+              </a:ext>
+            </a:extLst>
+          </p:cNvPr>
+          <p:cNvPicPr>
+            <a:picLocks noChangeAspect="1"/>
+          </p:cNvPicPr>
+          <p:nvPr/>
+        </p:nvPicPr>
+        <p:blipFill>
+          <a:blip r:embed="rId3"/>
+          <a:stretch>
+            <a:fillRect/>
+          </a:stretch>
+        </p:blipFill>
+        <p:spPr>
+          <a:xfrm>
+            <a:off x="0" y="1319455"/>
+            <a:ext cx="12192000" cy="103828"/>
+          </a:xfrm>
+          <a:prstGeom prst="rect">
+            <a:avLst/>
+          </a:prstGeom>
+        </p:spPr>
+      </p:pic>
+      <p:pic>
+        <p:nvPicPr>
+          <p:cNvPr id="6" name="Picture 5" descr="QR Code for https://aka.ms/HeartlandDev22 &#10;Scan to follow along the examples and additional documentation">
+            <a:extLst>
+              <a:ext uri="{FF2B5EF4-FFF2-40B4-BE49-F238E27FC236}">
+                <a16:creationId xmlns:a16="http://schemas.microsoft.com/office/drawing/2014/main" id="{CB9ABBDC-EA25-D893-B162-876448EAEE17}"/>
+              </a:ext>
+            </a:extLst>
+          </p:cNvPr>
+          <p:cNvPicPr>
+            <a:picLocks noChangeAspect="1"/>
+          </p:cNvPicPr>
+          <p:nvPr/>
+        </p:nvPicPr>
+        <p:blipFill>
+          <a:blip r:embed="rId4">
+            <a:extLst>
+              <a:ext uri="{28A0092B-C50C-407E-A947-70E740481C1C}">
+                <a14:useLocalDpi xmlns:a14="http://schemas.microsoft.com/office/drawing/2010/main" val="0"/>
+              </a:ext>
+            </a:extLst>
+          </a:blip>
+          <a:stretch>
+            <a:fillRect/>
+          </a:stretch>
+        </p:blipFill>
+        <p:spPr>
+          <a:xfrm>
+            <a:off x="11701035" y="0"/>
+            <a:ext cx="490965" cy="490965"/>
+          </a:xfrm>
+          <a:prstGeom prst="rect">
+            <a:avLst/>
+          </a:prstGeom>
+        </p:spPr>
+      </p:pic>
+      <p:sp>
+        <p:nvSpPr>
+          <p:cNvPr id="7" name="TextBox 6">
+            <a:extLst>
+              <a:ext uri="{FF2B5EF4-FFF2-40B4-BE49-F238E27FC236}">
+                <a16:creationId xmlns:a16="http://schemas.microsoft.com/office/drawing/2014/main" id="{33B8F789-3708-DDDA-E304-08775B9ACC38}"/>
+              </a:ext>
+            </a:extLst>
+          </p:cNvPr>
+          <p:cNvSpPr txBox="1"/>
+          <p:nvPr/>
+        </p:nvSpPr>
+        <p:spPr>
+          <a:xfrm>
+            <a:off x="9684136" y="89970"/>
+            <a:ext cx="2016899" cy="261610"/>
+          </a:xfrm>
+          <a:prstGeom prst="rect">
+            <a:avLst/>
+          </a:prstGeom>
+          <a:noFill/>
+        </p:spPr>
+        <p:txBody>
+          <a:bodyPr wrap="none" rtlCol="0">
+            <a:spAutoFit/>
+          </a:bodyPr>
+          <a:lstStyle/>
+          <a:p>
+            <a:r>
+              <a:rPr lang="en-US" sz="1100" dirty="0">
+                <a:solidFill>
+                  <a:srgbClr val="3E4AC4"/>
+                </a:solidFill>
+              </a:rPr>
+              <a:t>https://aka.ms/HeartlandDev22</a:t>
+            </a:r>
+          </a:p>
+        </p:txBody>
+      </p:sp>
+    </p:spTree>
+    <p:extLst>
+      <p:ext uri="{BB962C8B-B14F-4D97-AF65-F5344CB8AC3E}">
+        <p14:creationId xmlns:p14="http://schemas.microsoft.com/office/powerpoint/2010/main" val="2924000461"/>
+      </p:ext>
+    </p:extLst>
+  </p:cSld>
+  <p:clrMapOvr>
+    <a:masterClrMapping/>
+  </p:clrMapOvr>
+</p:sld>
+</file>
+
+<file path=ppt/slides/slide3.xml><?xml version="1.0" encoding="utf-8"?>
+<p:sld xmlns:a="http://schemas.openxmlformats.org/drawingml/2006/main" xmlns:r="http://schemas.openxmlformats.org/officeDocument/2006/relationships" xmlns:p="http://schemas.openxmlformats.org/presentationml/2006/main">
+  <p:cSld>
+    <p:bg>
+      <p:bgPr>
+        <a:solidFill>
+          <a:srgbClr val="FFFEE1">
+            <a:alpha val="75000"/>
+          </a:srgbClr>
+        </a:solidFill>
+        <a:effectLst/>
+      </p:bgPr>
+    </p:bg>
+    <p:spTree>
+      <p:nvGrpSpPr>
+        <p:cNvPr id="1" name=""/>
+        <p:cNvGrpSpPr/>
+        <p:nvPr/>
+      </p:nvGrpSpPr>
+      <p:grpSpPr>
+        <a:xfrm>
+          <a:off x="0" y="0"/>
+          <a:ext cx="0" cy="0"/>
+          <a:chOff x="0" y="0"/>
+          <a:chExt cx="0" cy="0"/>
+        </a:xfrm>
+      </p:grpSpPr>
+      <p:sp>
+        <p:nvSpPr>
+          <p:cNvPr id="2" name="Title 1">
+            <a:extLst>
+              <a:ext uri="{FF2B5EF4-FFF2-40B4-BE49-F238E27FC236}">
+                <a16:creationId xmlns:a16="http://schemas.microsoft.com/office/drawing/2014/main" id="{035965DC-3D32-F679-9584-54CCA936BC7A}"/>
+              </a:ext>
+            </a:extLst>
+          </p:cNvPr>
+          <p:cNvSpPr>
+            <a:spLocks noGrp="1"/>
+          </p:cNvSpPr>
+          <p:nvPr>
+            <p:ph type="title"/>
+          </p:nvPr>
+        </p:nvSpPr>
+        <p:spPr>
+          <a:xfrm>
+            <a:off x="594360" y="687479"/>
+            <a:ext cx="3444240" cy="1574874"/>
+          </a:xfrm>
+        </p:spPr>
+        <p:txBody>
+          <a:bodyPr vert="horz" lIns="91440" tIns="45720" rIns="91440" bIns="45720" rtlCol="0" anchor="b">
+            <a:normAutofit/>
+          </a:bodyPr>
+          <a:lstStyle/>
+          <a:p>
+            <a:r>
+              <a:rPr lang="en-US" sz="3400" kern="1200" dirty="0">
+                <a:latin typeface="+mj-lt"/>
+                <a:ea typeface="+mj-ea"/>
+                <a:cs typeface="+mj-cs"/>
+              </a:rPr>
+              <a:t>John</a:t>
+            </a:r>
+            <a:r>
+              <a:rPr lang="en-US" sz="3400" kern="1200" dirty="0">
+                <a:solidFill>
+                  <a:schemeClr val="tx1"/>
+                </a:solidFill>
+                <a:latin typeface="+mj-lt"/>
+                <a:ea typeface="+mj-ea"/>
+                <a:cs typeface="+mj-cs"/>
+              </a:rPr>
+              <a:t> </a:t>
+            </a:r>
+            <a:r>
+              <a:rPr lang="en-US" sz="3400" kern="1200" dirty="0">
+                <a:latin typeface="+mj-lt"/>
+                <a:ea typeface="+mj-ea"/>
+                <a:cs typeface="+mj-cs"/>
+              </a:rPr>
+              <a:t>Folberth</a:t>
+            </a:r>
+          </a:p>
+        </p:txBody>
+      </p:sp>
+      <p:sp>
+        <p:nvSpPr>
+          <p:cNvPr id="4" name="Text Placeholder 3" descr="Former Azure MVP&#10;Microsoft Certified Trainer (MCT)&#10;DevOps Advocate&#10;Peer reviewer on “Building Application with Azure Resource Manager: Leverage IaC to Vastly Improve the Life Cycle of your Applications”&#10;Spoken at various User Groups and Conferences on topics ranging from Infrastructure as Code, DevOps YAML Pipelines, and modern Data Analytics Platforms&#10;Experience as Lead DevOps engineer on multiple accounts&#10;Served as Tech Lead on a Cloud Center of Excellence team implementing Azure for a health insurance company&#10;">
+            <a:extLst>
+              <a:ext uri="{FF2B5EF4-FFF2-40B4-BE49-F238E27FC236}">
+                <a16:creationId xmlns:a16="http://schemas.microsoft.com/office/drawing/2014/main" id="{408EB074-6D94-D770-1DBB-E2E67F2E5EB5}"/>
+              </a:ext>
+            </a:extLst>
+          </p:cNvPr>
+          <p:cNvSpPr>
+            <a:spLocks noGrp="1"/>
+          </p:cNvSpPr>
+          <p:nvPr>
+            <p:ph type="body" sz="half" idx="2"/>
+          </p:nvPr>
+        </p:nvSpPr>
+        <p:spPr>
+          <a:xfrm>
+            <a:off x="594360" y="3155626"/>
+            <a:ext cx="3444240" cy="2935176"/>
+          </a:xfrm>
+        </p:spPr>
+        <p:txBody>
+          <a:bodyPr vert="horz" lIns="91440" tIns="45720" rIns="91440" bIns="45720" rtlCol="0" anchor="ctr">
+            <a:normAutofit fontScale="92500" lnSpcReduction="20000"/>
+          </a:bodyPr>
+          <a:lstStyle/>
+          <a:p>
+            <a:pPr marL="285750" indent="-228600">
+              <a:buFont typeface="Arial" panose="020B0604020202020204" pitchFamily="34" charset="0"/>
+              <a:buChar char="•"/>
+            </a:pPr>
+            <a:r>
+              <a:rPr lang="en-US" sz="1400" dirty="0">
+                <a:ea typeface="Calibri"/>
+                <a:cs typeface="Calibri"/>
+              </a:rPr>
+              <a:t>Based out of Grand Rapids, MI</a:t>
+            </a:r>
+            <a:endParaRPr lang="en-US" sz="1400" dirty="0"/>
+          </a:p>
+          <a:p>
+            <a:pPr marL="285750" indent="-228600">
+              <a:buFont typeface="Arial" panose="020B0604020202020204" pitchFamily="34" charset="0"/>
+              <a:buChar char="•"/>
+            </a:pPr>
+            <a:r>
+              <a:rPr lang="en-US" sz="1400" dirty="0"/>
+              <a:t>Former Azure MVP</a:t>
+            </a:r>
+            <a:endParaRPr lang="en-US" dirty="0"/>
+          </a:p>
+          <a:p>
+            <a:pPr marL="285750" indent="-228600">
+              <a:buFont typeface="Arial" panose="020B0604020202020204" pitchFamily="34" charset="0"/>
+              <a:buChar char="•"/>
+            </a:pPr>
+            <a:r>
+              <a:rPr lang="en-US" sz="1400" dirty="0"/>
+              <a:t>Microsoft Certified Trainer (MCT)</a:t>
+            </a:r>
+          </a:p>
+          <a:p>
+            <a:pPr marL="285750" indent="-228600">
+              <a:buFont typeface="Arial" panose="020B0604020202020204" pitchFamily="34" charset="0"/>
+              <a:buChar char="•"/>
+            </a:pPr>
+            <a:r>
+              <a:rPr lang="en-US" sz="1400" dirty="0"/>
+              <a:t>DevOps Advocate</a:t>
+            </a:r>
+          </a:p>
+          <a:p>
+            <a:pPr marL="285750" indent="-228600">
+              <a:buFont typeface="Arial" panose="020B0604020202020204" pitchFamily="34" charset="0"/>
+              <a:buChar char="•"/>
+            </a:pPr>
+            <a:r>
+              <a:rPr lang="en-US" sz="1400" dirty="0"/>
+              <a:t>Peer reviewer on “Building Application with Azure Resource Manager: Leverage </a:t>
+            </a:r>
+            <a:r>
+              <a:rPr lang="en-US" sz="1400" dirty="0" err="1"/>
+              <a:t>IaC</a:t>
+            </a:r>
+            <a:r>
+              <a:rPr lang="en-US" sz="1400" dirty="0"/>
+              <a:t> to Vastly Improve the Life Cycle of your Applications”</a:t>
+            </a:r>
+          </a:p>
+          <a:p>
+            <a:pPr marL="285750" indent="-228600">
+              <a:buFont typeface="Arial" panose="020B0604020202020204" pitchFamily="34" charset="0"/>
+              <a:buChar char="•"/>
+            </a:pPr>
+            <a:r>
+              <a:rPr lang="en-US" sz="1400" dirty="0"/>
+              <a:t>Spoken at various User Groups and Conferences on topics ranging from Infrastructure as Code, DevOps YAML Pipelines, and modern Data Analytics Platforms</a:t>
+            </a:r>
+          </a:p>
+          <a:p>
+            <a:pPr marL="283210" indent="-228600">
+              <a:buFont typeface="Arial" panose="020B0604020202020204" pitchFamily="34" charset="0"/>
+              <a:buChar char="•"/>
+            </a:pPr>
+            <a:r>
+              <a:rPr lang="en-US" sz="1400" dirty="0"/>
+              <a:t>Experience as Lead DevOps engineer on multiple accounts</a:t>
+            </a:r>
+            <a:endParaRPr lang="en-US" sz="1400" dirty="0">
+              <a:ea typeface="Calibri" panose="020F0502020204030204"/>
+              <a:cs typeface="Calibri" panose="020F0502020204030204"/>
+            </a:endParaRPr>
+          </a:p>
+          <a:p>
+            <a:pPr marL="285750" indent="-228600">
+              <a:buFont typeface="Arial" panose="020B0604020202020204" pitchFamily="34" charset="0"/>
+              <a:buChar char="•"/>
+            </a:pPr>
+            <a:endParaRPr lang="en-US" sz="1400" dirty="0"/>
+          </a:p>
+        </p:txBody>
+      </p:sp>
+      <p:sp>
+        <p:nvSpPr>
+          <p:cNvPr id="17" name="Oval 16" descr="Head shot of John Folberth">
+            <a:extLst>
+              <a:ext uri="{FF2B5EF4-FFF2-40B4-BE49-F238E27FC236}">
+                <a16:creationId xmlns:a16="http://schemas.microsoft.com/office/drawing/2014/main" id="{3501795D-45B4-90D8-776A-65B7713B7497}"/>
+              </a:ext>
+            </a:extLst>
+          </p:cNvPr>
+          <p:cNvSpPr/>
+          <p:nvPr/>
+        </p:nvSpPr>
+        <p:spPr>
+          <a:xfrm>
+            <a:off x="3307383" y="1036949"/>
+            <a:ext cx="1716606" cy="1716606"/>
+          </a:xfrm>
+          <a:prstGeom prst="ellipse">
+            <a:avLst/>
+          </a:prstGeom>
+          <a:blipFill rotWithShape="1">
+            <a:blip r:embed="rId2">
+              <a:extLst>
+                <a:ext uri="{28A0092B-C50C-407E-A947-70E740481C1C}">
+                  <a14:useLocalDpi xmlns:a14="http://schemas.microsoft.com/office/drawing/2010/main" val="0"/>
+                </a:ext>
+              </a:extLst>
+            </a:blip>
+            <a:srcRect/>
+            <a:stretch>
+              <a:fillRect t="-16000" b="-16000"/>
+            </a:stretch>
+          </a:blipFill>
+        </p:spPr>
+        <p:style>
+          <a:lnRef idx="2">
+            <a:schemeClr val="lt1">
+              <a:hueOff val="0"/>
+              <a:satOff val="0"/>
+              <a:lumOff val="0"/>
+              <a:alphaOff val="0"/>
+            </a:schemeClr>
+          </a:lnRef>
+          <a:fillRef idx="1">
+            <a:scrgbClr r="0" g="0" b="0"/>
+          </a:fillRef>
+          <a:effectRef idx="0">
+            <a:schemeClr val="accent1">
+              <a:tint val="50000"/>
+              <a:hueOff val="0"/>
+              <a:satOff val="0"/>
+              <a:lumOff val="0"/>
+              <a:alphaOff val="0"/>
+            </a:schemeClr>
+          </a:effectRef>
+          <a:fontRef idx="minor">
+            <a:schemeClr val="lt1">
+              <a:hueOff val="0"/>
+              <a:satOff val="0"/>
+              <a:lumOff val="0"/>
+              <a:alphaOff val="0"/>
+            </a:schemeClr>
+          </a:fontRef>
+        </p:style>
+      </p:sp>
+      <p:pic>
+        <p:nvPicPr>
+          <p:cNvPr id="1032" name="Picture 8" descr="Microsoft logo in white and gray">
+            <a:extLst>
+              <a:ext uri="{FF2B5EF4-FFF2-40B4-BE49-F238E27FC236}">
+                <a16:creationId xmlns:a16="http://schemas.microsoft.com/office/drawing/2014/main" id="{9F2BDDFE-FEC7-E9E1-5173-E9C15ADC318A}"/>
+              </a:ext>
+            </a:extLst>
+          </p:cNvPr>
+          <p:cNvPicPr>
+            <a:picLocks noChangeAspect="1" noChangeArrowheads="1"/>
+          </p:cNvPicPr>
+          <p:nvPr/>
+        </p:nvPicPr>
+        <p:blipFill>
+          <a:blip r:embed="rId3">
+            <a:extLst>
+              <a:ext uri="{28A0092B-C50C-407E-A947-70E740481C1C}">
+                <a14:useLocalDpi xmlns:a14="http://schemas.microsoft.com/office/drawing/2010/main" val="0"/>
+              </a:ext>
+            </a:extLst>
+          </a:blip>
+          <a:srcRect/>
+          <a:stretch>
+            <a:fillRect/>
+          </a:stretch>
+        </p:blipFill>
+        <p:spPr bwMode="auto">
+          <a:xfrm>
+            <a:off x="6500042" y="4789795"/>
+            <a:ext cx="5741611" cy="2572109"/>
+          </a:xfrm>
+          <a:prstGeom prst="rect">
+            <a:avLst/>
+          </a:prstGeom>
+          <a:noFill/>
+          <a:extLst>
+            <a:ext uri="{909E8E84-426E-40DD-AFC4-6F175D3DCCD1}">
+              <a14:hiddenFill xmlns:a14="http://schemas.microsoft.com/office/drawing/2010/main">
+                <a:solidFill>
+                  <a:srgbClr val="FFFFFF"/>
+                </a:solidFill>
+              </a14:hiddenFill>
+            </a:ext>
+          </a:extLst>
+        </p:spPr>
+      </p:pic>
+      <p:pic>
+        <p:nvPicPr>
+          <p:cNvPr id="16" name="Picture 15" descr="Graphical user interface, application, Teams&#10;&#10;Description automatically generated">
+            <a:extLst>
+              <a:ext uri="{FF2B5EF4-FFF2-40B4-BE49-F238E27FC236}">
+                <a16:creationId xmlns:a16="http://schemas.microsoft.com/office/drawing/2014/main" id="{2FBAAC76-8D3C-5481-63CC-657B8447BB20}"/>
+              </a:ext>
+            </a:extLst>
+          </p:cNvPr>
+          <p:cNvPicPr>
+            <a:picLocks noChangeAspect="1"/>
+          </p:cNvPicPr>
+          <p:nvPr/>
+        </p:nvPicPr>
+        <p:blipFill>
+          <a:blip r:embed="rId4">
+            <a:extLst>
+              <a:ext uri="{28A0092B-C50C-407E-A947-70E740481C1C}">
+                <a14:useLocalDpi xmlns:a14="http://schemas.microsoft.com/office/drawing/2010/main" val="0"/>
+              </a:ext>
+            </a:extLst>
+          </a:blip>
+          <a:stretch>
+            <a:fillRect/>
+          </a:stretch>
+        </p:blipFill>
+        <p:spPr>
+          <a:xfrm>
+            <a:off x="10117717" y="3155626"/>
+            <a:ext cx="1828800" cy="1828800"/>
+          </a:xfrm>
+          <a:prstGeom prst="rect">
+            <a:avLst/>
+          </a:prstGeom>
+        </p:spPr>
+      </p:pic>
+      <p:pic>
+        <p:nvPicPr>
+          <p:cNvPr id="18" name="Picture 17">
+            <a:extLst>
+              <a:ext uri="{FF2B5EF4-FFF2-40B4-BE49-F238E27FC236}">
+                <a16:creationId xmlns:a16="http://schemas.microsoft.com/office/drawing/2014/main" id="{987CC5BD-F451-A646-2A39-7DE3722ED90B}"/>
+              </a:ext>
+            </a:extLst>
+          </p:cNvPr>
+          <p:cNvPicPr>
+            <a:picLocks noChangeAspect="1"/>
+          </p:cNvPicPr>
+          <p:nvPr/>
+        </p:nvPicPr>
+        <p:blipFill>
+          <a:blip r:embed="rId5"/>
+          <a:stretch>
+            <a:fillRect/>
+          </a:stretch>
+        </p:blipFill>
+        <p:spPr>
+          <a:xfrm>
+            <a:off x="229352" y="2753555"/>
+            <a:ext cx="4794637" cy="94894"/>
+          </a:xfrm>
+          <a:prstGeom prst="rect">
+            <a:avLst/>
+          </a:prstGeom>
+        </p:spPr>
+      </p:pic>
+      <p:pic>
+        <p:nvPicPr>
+          <p:cNvPr id="3" name="Picture 2" descr="QR Code for https://aka.ms/HeartlandDev22 &#10;Scan to follow along the examples and additional documentation">
+            <a:extLst>
+              <a:ext uri="{FF2B5EF4-FFF2-40B4-BE49-F238E27FC236}">
+                <a16:creationId xmlns:a16="http://schemas.microsoft.com/office/drawing/2014/main" id="{FA94FFC7-B565-402E-2D3E-6FE68E7B014F}"/>
+              </a:ext>
+            </a:extLst>
+          </p:cNvPr>
+          <p:cNvPicPr>
+            <a:picLocks noChangeAspect="1"/>
+          </p:cNvPicPr>
+          <p:nvPr/>
+        </p:nvPicPr>
+        <p:blipFill>
+          <a:blip r:embed="rId6">
+            <a:extLst>
+              <a:ext uri="{28A0092B-C50C-407E-A947-70E740481C1C}">
+                <a14:useLocalDpi xmlns:a14="http://schemas.microsoft.com/office/drawing/2010/main" val="0"/>
+              </a:ext>
+            </a:extLst>
+          </a:blip>
+          <a:stretch>
+            <a:fillRect/>
+          </a:stretch>
+        </p:blipFill>
+        <p:spPr>
+          <a:xfrm>
+            <a:off x="11701035" y="0"/>
+            <a:ext cx="490965" cy="490965"/>
+          </a:xfrm>
+          <a:prstGeom prst="rect">
+            <a:avLst/>
+          </a:prstGeom>
+        </p:spPr>
+      </p:pic>
+      <p:sp>
+        <p:nvSpPr>
+          <p:cNvPr id="6" name="TextBox 5">
+            <a:extLst>
+              <a:ext uri="{FF2B5EF4-FFF2-40B4-BE49-F238E27FC236}">
+                <a16:creationId xmlns:a16="http://schemas.microsoft.com/office/drawing/2014/main" id="{D00D27B0-AA10-37C8-FD58-C7E40D437F8F}"/>
+              </a:ext>
+            </a:extLst>
+          </p:cNvPr>
+          <p:cNvSpPr txBox="1"/>
+          <p:nvPr/>
+        </p:nvSpPr>
+        <p:spPr>
+          <a:xfrm>
+            <a:off x="9684136" y="89970"/>
+            <a:ext cx="2016899" cy="261610"/>
+          </a:xfrm>
+          <a:prstGeom prst="rect">
+            <a:avLst/>
+          </a:prstGeom>
+          <a:noFill/>
+        </p:spPr>
+        <p:txBody>
+          <a:bodyPr wrap="none" rtlCol="0">
+            <a:spAutoFit/>
+          </a:bodyPr>
+          <a:lstStyle/>
+          <a:p>
+            <a:r>
+              <a:rPr lang="en-US" sz="1100" dirty="0">
+                <a:solidFill>
+                  <a:srgbClr val="3E4AC4"/>
+                </a:solidFill>
+              </a:rPr>
+              <a:t>https://aka.ms/HeartlandDev22</a:t>
+            </a:r>
+          </a:p>
+        </p:txBody>
+      </p:sp>
+      <p:pic>
+        <p:nvPicPr>
+          <p:cNvPr id="8" name="Picture 2" descr="Linkedin - Free social media icons">
+            <a:hlinkClick r:id="rId7"/>
+            <a:extLst>
+              <a:ext uri="{FF2B5EF4-FFF2-40B4-BE49-F238E27FC236}">
+                <a16:creationId xmlns:a16="http://schemas.microsoft.com/office/drawing/2014/main" id="{5BDAE7A1-3E2A-A221-0C36-597E9468D50E}"/>
+              </a:ext>
+            </a:extLst>
+          </p:cNvPr>
+          <p:cNvPicPr>
+            <a:picLocks noChangeAspect="1" noChangeArrowheads="1"/>
+          </p:cNvPicPr>
+          <p:nvPr/>
+        </p:nvPicPr>
+        <p:blipFill>
+          <a:blip r:embed="rId8">
+            <a:extLst>
+              <a:ext uri="{28A0092B-C50C-407E-A947-70E740481C1C}">
+                <a14:useLocalDpi xmlns:a14="http://schemas.microsoft.com/office/drawing/2010/main" val="0"/>
+              </a:ext>
+            </a:extLst>
+          </a:blip>
+          <a:srcRect/>
+          <a:stretch>
+            <a:fillRect/>
+          </a:stretch>
+        </p:blipFill>
+        <p:spPr bwMode="auto">
+          <a:xfrm>
+            <a:off x="629867" y="2325647"/>
+            <a:ext cx="161389" cy="161389"/>
+          </a:xfrm>
+          <a:prstGeom prst="rect">
+            <a:avLst/>
+          </a:prstGeom>
+          <a:noFill/>
+          <a:extLst>
+            <a:ext uri="{909E8E84-426E-40DD-AFC4-6F175D3DCCD1}">
+              <a14:hiddenFill xmlns:a14="http://schemas.microsoft.com/office/drawing/2010/main">
+                <a:solidFill>
+                  <a:srgbClr val="FFFFFF"/>
+                </a:solidFill>
+              </a14:hiddenFill>
+            </a:ext>
+          </a:extLst>
+        </p:spPr>
+      </p:pic>
+      <p:sp>
+        <p:nvSpPr>
+          <p:cNvPr id="10" name="TextBox 9">
+            <a:extLst>
+              <a:ext uri="{FF2B5EF4-FFF2-40B4-BE49-F238E27FC236}">
+                <a16:creationId xmlns:a16="http://schemas.microsoft.com/office/drawing/2014/main" id="{4B4DCEC8-1F63-6023-8629-BA82C8359998}"/>
+              </a:ext>
+            </a:extLst>
+          </p:cNvPr>
+          <p:cNvSpPr txBox="1"/>
+          <p:nvPr/>
+        </p:nvSpPr>
+        <p:spPr>
+          <a:xfrm>
+            <a:off x="749424" y="2295730"/>
+            <a:ext cx="821927" cy="215444"/>
+          </a:xfrm>
+          <a:prstGeom prst="rect">
+            <a:avLst/>
+          </a:prstGeom>
+          <a:noFill/>
+        </p:spPr>
+        <p:txBody>
+          <a:bodyPr wrap="square" rtlCol="0">
+            <a:spAutoFit/>
+          </a:bodyPr>
+          <a:lstStyle/>
+          <a:p>
+            <a:r>
+              <a:rPr lang="en-US" sz="800" dirty="0"/>
+              <a:t>John-Folberth</a:t>
+            </a:r>
+          </a:p>
+        </p:txBody>
+      </p:sp>
+      <p:pic>
+        <p:nvPicPr>
+          <p:cNvPr id="12" name="Picture 4" descr="Github Logo - Free social media icons">
+            <a:hlinkClick r:id="rId9"/>
+            <a:extLst>
+              <a:ext uri="{FF2B5EF4-FFF2-40B4-BE49-F238E27FC236}">
+                <a16:creationId xmlns:a16="http://schemas.microsoft.com/office/drawing/2014/main" id="{207F9767-DE1C-7C00-0A2E-86540022E6C1}"/>
+              </a:ext>
+            </a:extLst>
+          </p:cNvPr>
+          <p:cNvPicPr>
+            <a:picLocks noChangeAspect="1" noChangeArrowheads="1"/>
+          </p:cNvPicPr>
+          <p:nvPr/>
+        </p:nvPicPr>
+        <p:blipFill>
+          <a:blip r:embed="rId10">
+            <a:extLst>
+              <a:ext uri="{28A0092B-C50C-407E-A947-70E740481C1C}">
+                <a14:useLocalDpi xmlns:a14="http://schemas.microsoft.com/office/drawing/2010/main" val="0"/>
+              </a:ext>
+            </a:extLst>
+          </a:blip>
+          <a:srcRect/>
+          <a:stretch>
+            <a:fillRect/>
+          </a:stretch>
+        </p:blipFill>
+        <p:spPr bwMode="auto">
+          <a:xfrm>
+            <a:off x="1481435" y="2316838"/>
+            <a:ext cx="161389" cy="161389"/>
+          </a:xfrm>
+          <a:prstGeom prst="rect">
+            <a:avLst/>
+          </a:prstGeom>
+          <a:noFill/>
+          <a:extLst>
+            <a:ext uri="{909E8E84-426E-40DD-AFC4-6F175D3DCCD1}">
+              <a14:hiddenFill xmlns:a14="http://schemas.microsoft.com/office/drawing/2010/main">
+                <a:solidFill>
+                  <a:srgbClr val="FFFFFF"/>
+                </a:solidFill>
+              </a14:hiddenFill>
+            </a:ext>
+          </a:extLst>
+        </p:spPr>
+      </p:pic>
+      <p:sp>
+        <p:nvSpPr>
+          <p:cNvPr id="13" name="TextBox 12">
+            <a:extLst>
+              <a:ext uri="{FF2B5EF4-FFF2-40B4-BE49-F238E27FC236}">
+                <a16:creationId xmlns:a16="http://schemas.microsoft.com/office/drawing/2014/main" id="{C98CF1FE-09AA-5871-3610-5E774CD91EE8}"/>
+              </a:ext>
+            </a:extLst>
+          </p:cNvPr>
+          <p:cNvSpPr txBox="1"/>
+          <p:nvPr/>
+        </p:nvSpPr>
+        <p:spPr>
+          <a:xfrm>
+            <a:off x="1639776" y="2287412"/>
+            <a:ext cx="821927" cy="215444"/>
+          </a:xfrm>
+          <a:prstGeom prst="rect">
+            <a:avLst/>
+          </a:prstGeom>
+          <a:noFill/>
+        </p:spPr>
+        <p:txBody>
+          <a:bodyPr wrap="square" rtlCol="0">
+            <a:spAutoFit/>
+          </a:bodyPr>
+          <a:lstStyle/>
+          <a:p>
+            <a:r>
+              <a:rPr lang="en-US" sz="800" dirty="0" err="1"/>
+              <a:t>JFolberth</a:t>
+            </a:r>
+            <a:endParaRPr lang="en-US" sz="800" dirty="0"/>
+          </a:p>
+        </p:txBody>
+      </p:sp>
+      <p:pic>
+        <p:nvPicPr>
+          <p:cNvPr id="15" name="Picture 6" descr="Twitter - Free social media icons">
+            <a:hlinkClick r:id="rId11"/>
+            <a:extLst>
+              <a:ext uri="{FF2B5EF4-FFF2-40B4-BE49-F238E27FC236}">
+                <a16:creationId xmlns:a16="http://schemas.microsoft.com/office/drawing/2014/main" id="{956A9F8F-1F43-C6AA-AB7F-C4F0E54638E4}"/>
+              </a:ext>
+            </a:extLst>
+          </p:cNvPr>
+          <p:cNvPicPr>
+            <a:picLocks noChangeAspect="1" noChangeArrowheads="1"/>
+          </p:cNvPicPr>
+          <p:nvPr/>
+        </p:nvPicPr>
+        <p:blipFill>
+          <a:blip r:embed="rId12">
+            <a:extLst>
+              <a:ext uri="{28A0092B-C50C-407E-A947-70E740481C1C}">
+                <a14:useLocalDpi xmlns:a14="http://schemas.microsoft.com/office/drawing/2010/main" val="0"/>
+              </a:ext>
+            </a:extLst>
+          </a:blip>
+          <a:srcRect/>
+          <a:stretch>
+            <a:fillRect/>
+          </a:stretch>
+        </p:blipFill>
+        <p:spPr bwMode="auto">
+          <a:xfrm>
+            <a:off x="2240559" y="2309215"/>
+            <a:ext cx="161390" cy="161390"/>
+          </a:xfrm>
+          <a:prstGeom prst="rect">
+            <a:avLst/>
+          </a:prstGeom>
+          <a:noFill/>
+          <a:extLst>
+            <a:ext uri="{909E8E84-426E-40DD-AFC4-6F175D3DCCD1}">
+              <a14:hiddenFill xmlns:a14="http://schemas.microsoft.com/office/drawing/2010/main">
+                <a:solidFill>
+                  <a:srgbClr val="FFFFFF"/>
+                </a:solidFill>
+              </a14:hiddenFill>
+            </a:ext>
+          </a:extLst>
+        </p:spPr>
+      </p:pic>
+      <p:sp>
+        <p:nvSpPr>
+          <p:cNvPr id="19" name="TextBox 18">
+            <a:extLst>
+              <a:ext uri="{FF2B5EF4-FFF2-40B4-BE49-F238E27FC236}">
+                <a16:creationId xmlns:a16="http://schemas.microsoft.com/office/drawing/2014/main" id="{2E8D36F4-CEFA-2C77-C73B-BF48C53818BE}"/>
+              </a:ext>
+            </a:extLst>
+          </p:cNvPr>
+          <p:cNvSpPr txBox="1"/>
+          <p:nvPr/>
+        </p:nvSpPr>
+        <p:spPr>
+          <a:xfrm>
+            <a:off x="2398899" y="2277046"/>
+            <a:ext cx="821927" cy="215444"/>
+          </a:xfrm>
+          <a:prstGeom prst="rect">
+            <a:avLst/>
+          </a:prstGeom>
+          <a:noFill/>
+        </p:spPr>
+        <p:txBody>
+          <a:bodyPr wrap="square" rtlCol="0">
+            <a:spAutoFit/>
+          </a:bodyPr>
+          <a:lstStyle/>
+          <a:p>
+            <a:r>
+              <a:rPr lang="en-US" sz="800" dirty="0" err="1"/>
+              <a:t>j_Folberth</a:t>
+            </a:r>
+            <a:endParaRPr lang="en-US" sz="800" dirty="0"/>
+          </a:p>
+        </p:txBody>
+      </p:sp>
+      <p:pic>
+        <p:nvPicPr>
+          <p:cNvPr id="21" name="Picture 20">
+            <a:extLst>
+              <a:ext uri="{FF2B5EF4-FFF2-40B4-BE49-F238E27FC236}">
+                <a16:creationId xmlns:a16="http://schemas.microsoft.com/office/drawing/2014/main" id="{C2A6DEDB-8209-C974-48C2-1C6F80987F07}"/>
+              </a:ext>
+            </a:extLst>
+          </p:cNvPr>
+          <p:cNvPicPr>
+            <a:picLocks noChangeAspect="1"/>
+          </p:cNvPicPr>
+          <p:nvPr/>
+        </p:nvPicPr>
+        <p:blipFill>
+          <a:blip r:embed="rId13">
+            <a:extLst>
+              <a:ext uri="{28A0092B-C50C-407E-A947-70E740481C1C}">
+                <a14:useLocalDpi xmlns:a14="http://schemas.microsoft.com/office/drawing/2010/main" val="0"/>
+              </a:ext>
+            </a:extLst>
+          </a:blip>
+          <a:stretch>
+            <a:fillRect/>
+          </a:stretch>
+        </p:blipFill>
+        <p:spPr>
+          <a:xfrm>
+            <a:off x="6211522" y="698451"/>
+            <a:ext cx="1890498" cy="1890498"/>
+          </a:xfrm>
+          <a:prstGeom prst="rect">
+            <a:avLst/>
+          </a:prstGeom>
+        </p:spPr>
+      </p:pic>
+      <p:pic>
+        <p:nvPicPr>
+          <p:cNvPr id="25" name="Picture 24">
+            <a:extLst>
+              <a:ext uri="{FF2B5EF4-FFF2-40B4-BE49-F238E27FC236}">
+                <a16:creationId xmlns:a16="http://schemas.microsoft.com/office/drawing/2014/main" id="{DE11FD90-8E09-D4CC-1772-89A01676379F}"/>
+              </a:ext>
+            </a:extLst>
+          </p:cNvPr>
+          <p:cNvPicPr>
+            <a:picLocks noChangeAspect="1"/>
+          </p:cNvPicPr>
+          <p:nvPr/>
+        </p:nvPicPr>
+        <p:blipFill>
+          <a:blip r:embed="rId14">
+            <a:extLst>
+              <a:ext uri="{28A0092B-C50C-407E-A947-70E740481C1C}">
+                <a14:useLocalDpi xmlns:a14="http://schemas.microsoft.com/office/drawing/2010/main" val="0"/>
+              </a:ext>
+            </a:extLst>
+          </a:blip>
+          <a:stretch>
+            <a:fillRect/>
+          </a:stretch>
+        </p:blipFill>
+        <p:spPr>
+          <a:xfrm>
+            <a:off x="8169792" y="687479"/>
+            <a:ext cx="1890498" cy="1890498"/>
+          </a:xfrm>
+          <a:prstGeom prst="rect">
+            <a:avLst/>
+          </a:prstGeom>
+        </p:spPr>
+      </p:pic>
+      <p:pic>
+        <p:nvPicPr>
+          <p:cNvPr id="27" name="Picture 26">
+            <a:extLst>
+              <a:ext uri="{FF2B5EF4-FFF2-40B4-BE49-F238E27FC236}">
+                <a16:creationId xmlns:a16="http://schemas.microsoft.com/office/drawing/2014/main" id="{95DCE661-3446-20F2-D606-8F437D166D70}"/>
+              </a:ext>
+            </a:extLst>
+          </p:cNvPr>
+          <p:cNvPicPr>
+            <a:picLocks noChangeAspect="1"/>
+          </p:cNvPicPr>
+          <p:nvPr/>
+        </p:nvPicPr>
+        <p:blipFill>
+          <a:blip r:embed="rId15">
+            <a:extLst>
+              <a:ext uri="{28A0092B-C50C-407E-A947-70E740481C1C}">
+                <a14:useLocalDpi xmlns:a14="http://schemas.microsoft.com/office/drawing/2010/main" val="0"/>
+              </a:ext>
+            </a:extLst>
+          </a:blip>
+          <a:stretch>
+            <a:fillRect/>
+          </a:stretch>
+        </p:blipFill>
+        <p:spPr>
+          <a:xfrm>
+            <a:off x="10135178" y="690664"/>
+            <a:ext cx="1890499" cy="1890499"/>
+          </a:xfrm>
+          <a:prstGeom prst="rect">
+            <a:avLst/>
+          </a:prstGeom>
+        </p:spPr>
+      </p:pic>
+      <p:pic>
+        <p:nvPicPr>
+          <p:cNvPr id="29" name="Picture 28">
+            <a:extLst>
+              <a:ext uri="{FF2B5EF4-FFF2-40B4-BE49-F238E27FC236}">
+                <a16:creationId xmlns:a16="http://schemas.microsoft.com/office/drawing/2014/main" id="{FEC5EEEB-FA7F-F19B-5492-44BDB9655760}"/>
+              </a:ext>
+            </a:extLst>
+          </p:cNvPr>
+          <p:cNvPicPr>
+            <a:picLocks noChangeAspect="1"/>
+          </p:cNvPicPr>
+          <p:nvPr/>
+        </p:nvPicPr>
+        <p:blipFill>
+          <a:blip r:embed="rId16">
+            <a:extLst>
+              <a:ext uri="{28A0092B-C50C-407E-A947-70E740481C1C}">
+                <a14:useLocalDpi xmlns:a14="http://schemas.microsoft.com/office/drawing/2010/main" val="0"/>
+              </a:ext>
+            </a:extLst>
+          </a:blip>
+          <a:stretch>
+            <a:fillRect/>
+          </a:stretch>
+        </p:blipFill>
+        <p:spPr>
+          <a:xfrm>
+            <a:off x="6254152" y="3070092"/>
+            <a:ext cx="1805238" cy="1805238"/>
+          </a:xfrm>
+          <a:prstGeom prst="rect">
+            <a:avLst/>
+          </a:prstGeom>
+        </p:spPr>
+      </p:pic>
+      <p:pic>
+        <p:nvPicPr>
+          <p:cNvPr id="31" name="Picture 30">
+            <a:extLst>
+              <a:ext uri="{FF2B5EF4-FFF2-40B4-BE49-F238E27FC236}">
+                <a16:creationId xmlns:a16="http://schemas.microsoft.com/office/drawing/2014/main" id="{10CD4550-0BC3-F2D4-BF87-0B4706FD3775}"/>
+              </a:ext>
+            </a:extLst>
+          </p:cNvPr>
+          <p:cNvPicPr>
+            <a:picLocks noChangeAspect="1"/>
+          </p:cNvPicPr>
+          <p:nvPr/>
+        </p:nvPicPr>
+        <p:blipFill>
+          <a:blip r:embed="rId17">
+            <a:extLst>
+              <a:ext uri="{28A0092B-C50C-407E-A947-70E740481C1C}">
+                <a14:useLocalDpi xmlns:a14="http://schemas.microsoft.com/office/drawing/2010/main" val="0"/>
+              </a:ext>
+            </a:extLst>
+          </a:blip>
+          <a:stretch>
+            <a:fillRect/>
+          </a:stretch>
+        </p:blipFill>
+        <p:spPr>
+          <a:xfrm>
+            <a:off x="8255052" y="3070092"/>
+            <a:ext cx="1805238" cy="1805238"/>
+          </a:xfrm>
+          <a:prstGeom prst="rect">
+            <a:avLst/>
+          </a:prstGeom>
+        </p:spPr>
+      </p:pic>
     </p:spTree>
     <p:extLst>
       <p:ext uri="{BB962C8B-B14F-4D97-AF65-F5344CB8AC3E}">
@@ -10418,14 +12030,14 @@
             <a:pPr lvl="1"/>
             <a:r>
               <a:rPr lang="en-US" dirty="0"/>
+              <a:t>Bicep</a:t>
+            </a:r>
+          </a:p>
+          <a:p>
+            <a:pPr lvl="1"/>
+            <a:r>
+              <a:rPr lang="en-US" dirty="0"/>
               <a:t>ARM</a:t>
-            </a:r>
-          </a:p>
-          <a:p>
-            <a:pPr lvl="1"/>
-            <a:r>
-              <a:rPr lang="en-US" dirty="0"/>
-              <a:t>Bicep</a:t>
             </a:r>
           </a:p>
           <a:p>
@@ -12157,6 +13769,19 @@
             </a:r>
           </a:p>
           <a:p>
+            <a:pPr>
+              <a:buFont typeface="Arial" panose="020B0604020202020204" pitchFamily="34" charset="0"/>
+              <a:buChar char="•"/>
+            </a:pPr>
+            <a:r>
+              <a:rPr lang="en-US" sz="1800" dirty="0"/>
+              <a:t>Foundational for DevOps</a:t>
+            </a:r>
+            <a:endParaRPr lang="en-US" sz="1800" b="0" i="0" dirty="0">
+              <a:effectLst/>
+            </a:endParaRPr>
+          </a:p>
+          <a:p>
             <a:pPr marL="0" indent="0">
               <a:buNone/>
             </a:pPr>
@@ -12532,6 +14157,55 @@
                       </p:childTnLst>
                     </p:cTn>
                   </p:par>
+                  <p:par>
+                    <p:cTn id="23" fill="hold">
+                      <p:stCondLst>
+                        <p:cond delay="indefinite"/>
+                      </p:stCondLst>
+                      <p:childTnLst>
+                        <p:par>
+                          <p:cTn id="24" fill="hold">
+                            <p:stCondLst>
+                              <p:cond delay="0"/>
+                            </p:stCondLst>
+                            <p:childTnLst>
+                              <p:par>
+                                <p:cTn id="25" presetID="1" presetClass="entr" presetSubtype="0" fill="hold" nodeType="clickEffect">
+                                  <p:stCondLst>
+                                    <p:cond delay="0"/>
+                                  </p:stCondLst>
+                                  <p:childTnLst>
+                                    <p:set>
+                                      <p:cBhvr>
+                                        <p:cTn id="26" dur="1" fill="hold">
+                                          <p:stCondLst>
+                                            <p:cond delay="0"/>
+                                          </p:stCondLst>
+                                        </p:cTn>
+                                        <p:tgtEl>
+                                          <p:spTgt spid="3">
+                                            <p:txEl>
+                                              <p:pRg st="5" end="5"/>
+                                            </p:txEl>
+                                          </p:spTgt>
+                                        </p:tgtEl>
+                                        <p:attrNameLst>
+                                          <p:attrName>style.visibility</p:attrName>
+                                        </p:attrNameLst>
+                                      </p:cBhvr>
+                                      <p:to>
+                                        <p:strVal val="visible"/>
+                                      </p:to>
+                                    </p:set>
+                                  </p:childTnLst>
+                                </p:cTn>
+                              </p:par>
+                            </p:childTnLst>
+                          </p:cTn>
+                        </p:par>
+                      </p:childTnLst>
+                    </p:cTn>
+                  </p:par>
                 </p:childTnLst>
               </p:cTn>
               <p:prevCondLst>
@@ -13345,14 +15019,14 @@
             <a:pPr lvl="1"/>
             <a:r>
               <a:rPr lang="en-US" dirty="0"/>
+              <a:t>Bicep</a:t>
+            </a:r>
+          </a:p>
+          <a:p>
+            <a:pPr lvl="1"/>
+            <a:r>
+              <a:rPr lang="en-US" dirty="0"/>
               <a:t>ARM</a:t>
-            </a:r>
-          </a:p>
-          <a:p>
-            <a:pPr lvl="1"/>
-            <a:r>
-              <a:rPr lang="en-US" dirty="0"/>
-              <a:t>Bicep</a:t>
             </a:r>
           </a:p>
           <a:p>

</xml_diff>